<commit_message>
More work done on presentation
</commit_message>
<xml_diff>
--- a/Virtual Pitch Presentation/Pitch.pptx
+++ b/Virtual Pitch Presentation/Pitch.pptx
@@ -5,7 +5,7 @@
     <p:sldMasterId id="2147483660" r:id="rId1"/>
   </p:sldMasterIdLst>
   <p:notesMasterIdLst>
-    <p:notesMasterId r:id="rId7"/>
+    <p:notesMasterId r:id="rId9"/>
   </p:notesMasterIdLst>
   <p:sldIdLst>
     <p:sldId id="256" r:id="rId2"/>
@@ -13,6 +13,8 @@
     <p:sldId id="258" r:id="rId4"/>
     <p:sldId id="259" r:id="rId5"/>
     <p:sldId id="260" r:id="rId6"/>
+    <p:sldId id="262" r:id="rId7"/>
+    <p:sldId id="263" r:id="rId8"/>
   </p:sldIdLst>
   <p:sldSz cx="12192000" cy="6858000"/>
   <p:notesSz cx="6858000" cy="9144000"/>
@@ -3259,7 +3261,7 @@
           <a:p>
             <a:fld id="{6548716A-9AA1-4737-8475-8931B3DEA5E3}" type="datetimeFigureOut">
               <a:rPr lang="en-GB" smtClean="0"/>
-              <a:t>09/07/2020</a:t>
+              <a:t>10/07/2020</a:t>
             </a:fld>
             <a:endParaRPr lang="en-GB"/>
           </a:p>
@@ -3812,6 +3814,174 @@
     <p:extLst>
       <p:ext uri="{BB962C8B-B14F-4D97-AF65-F5344CB8AC3E}">
         <p14:creationId xmlns:p14="http://schemas.microsoft.com/office/powerpoint/2010/main" val="3395066502"/>
+      </p:ext>
+    </p:extLst>
+  </p:cSld>
+  <p:clrMapOvr>
+    <a:masterClrMapping/>
+  </p:clrMapOvr>
+</p:notes>
+</file>
+
+<file path=ppt/notesSlides/notesSlide4.xml><?xml version="1.0" encoding="utf-8"?>
+<p:notes xmlns:a="http://schemas.openxmlformats.org/drawingml/2006/main" xmlns:r="http://schemas.openxmlformats.org/officeDocument/2006/relationships" xmlns:p="http://schemas.openxmlformats.org/presentationml/2006/main">
+  <p:cSld>
+    <p:spTree>
+      <p:nvGrpSpPr>
+        <p:cNvPr id="1" name=""/>
+        <p:cNvGrpSpPr/>
+        <p:nvPr/>
+      </p:nvGrpSpPr>
+      <p:grpSpPr>
+        <a:xfrm>
+          <a:off x="0" y="0"/>
+          <a:ext cx="0" cy="0"/>
+          <a:chOff x="0" y="0"/>
+          <a:chExt cx="0" cy="0"/>
+        </a:xfrm>
+      </p:grpSpPr>
+      <p:sp>
+        <p:nvSpPr>
+          <p:cNvPr id="2" name="Slide Image Placeholder 1"/>
+          <p:cNvSpPr>
+            <a:spLocks noGrp="1" noRot="1" noChangeAspect="1"/>
+          </p:cNvSpPr>
+          <p:nvPr>
+            <p:ph type="sldImg"/>
+          </p:nvPr>
+        </p:nvSpPr>
+        <p:spPr/>
+      </p:sp>
+      <p:sp>
+        <p:nvSpPr>
+          <p:cNvPr id="3" name="Notes Placeholder 2"/>
+          <p:cNvSpPr>
+            <a:spLocks noGrp="1"/>
+          </p:cNvSpPr>
+          <p:nvPr>
+            <p:ph type="body" idx="1"/>
+          </p:nvPr>
+        </p:nvSpPr>
+        <p:spPr/>
+        <p:txBody>
+          <a:bodyPr/>
+          <a:lstStyle/>
+          <a:p>
+            <a:endParaRPr lang="en-GB" dirty="0"/>
+          </a:p>
+        </p:txBody>
+      </p:sp>
+      <p:sp>
+        <p:nvSpPr>
+          <p:cNvPr id="4" name="Slide Number Placeholder 3"/>
+          <p:cNvSpPr>
+            <a:spLocks noGrp="1"/>
+          </p:cNvSpPr>
+          <p:nvPr>
+            <p:ph type="sldNum" sz="quarter" idx="5"/>
+          </p:nvPr>
+        </p:nvSpPr>
+        <p:spPr/>
+        <p:txBody>
+          <a:bodyPr/>
+          <a:lstStyle/>
+          <a:p>
+            <a:fld id="{A71A206B-ED20-42CE-B0F2-11AE32B43494}" type="slidenum">
+              <a:rPr lang="en-GB" smtClean="0"/>
+              <a:t>6</a:t>
+            </a:fld>
+            <a:endParaRPr lang="en-GB"/>
+          </a:p>
+        </p:txBody>
+      </p:sp>
+    </p:spTree>
+    <p:extLst>
+      <p:ext uri="{BB962C8B-B14F-4D97-AF65-F5344CB8AC3E}">
+        <p14:creationId xmlns:p14="http://schemas.microsoft.com/office/powerpoint/2010/main" val="3277616290"/>
+      </p:ext>
+    </p:extLst>
+  </p:cSld>
+  <p:clrMapOvr>
+    <a:masterClrMapping/>
+  </p:clrMapOvr>
+</p:notes>
+</file>
+
+<file path=ppt/notesSlides/notesSlide5.xml><?xml version="1.0" encoding="utf-8"?>
+<p:notes xmlns:a="http://schemas.openxmlformats.org/drawingml/2006/main" xmlns:r="http://schemas.openxmlformats.org/officeDocument/2006/relationships" xmlns:p="http://schemas.openxmlformats.org/presentationml/2006/main">
+  <p:cSld>
+    <p:spTree>
+      <p:nvGrpSpPr>
+        <p:cNvPr id="1" name=""/>
+        <p:cNvGrpSpPr/>
+        <p:nvPr/>
+      </p:nvGrpSpPr>
+      <p:grpSpPr>
+        <a:xfrm>
+          <a:off x="0" y="0"/>
+          <a:ext cx="0" cy="0"/>
+          <a:chOff x="0" y="0"/>
+          <a:chExt cx="0" cy="0"/>
+        </a:xfrm>
+      </p:grpSpPr>
+      <p:sp>
+        <p:nvSpPr>
+          <p:cNvPr id="2" name="Slide Image Placeholder 1"/>
+          <p:cNvSpPr>
+            <a:spLocks noGrp="1" noRot="1" noChangeAspect="1"/>
+          </p:cNvSpPr>
+          <p:nvPr>
+            <p:ph type="sldImg"/>
+          </p:nvPr>
+        </p:nvSpPr>
+        <p:spPr/>
+      </p:sp>
+      <p:sp>
+        <p:nvSpPr>
+          <p:cNvPr id="3" name="Notes Placeholder 2"/>
+          <p:cNvSpPr>
+            <a:spLocks noGrp="1"/>
+          </p:cNvSpPr>
+          <p:nvPr>
+            <p:ph type="body" idx="1"/>
+          </p:nvPr>
+        </p:nvSpPr>
+        <p:spPr/>
+        <p:txBody>
+          <a:bodyPr/>
+          <a:lstStyle/>
+          <a:p>
+            <a:endParaRPr lang="en-GB" dirty="0"/>
+          </a:p>
+        </p:txBody>
+      </p:sp>
+      <p:sp>
+        <p:nvSpPr>
+          <p:cNvPr id="4" name="Slide Number Placeholder 3"/>
+          <p:cNvSpPr>
+            <a:spLocks noGrp="1"/>
+          </p:cNvSpPr>
+          <p:nvPr>
+            <p:ph type="sldNum" sz="quarter" idx="5"/>
+          </p:nvPr>
+        </p:nvSpPr>
+        <p:spPr/>
+        <p:txBody>
+          <a:bodyPr/>
+          <a:lstStyle/>
+          <a:p>
+            <a:fld id="{A71A206B-ED20-42CE-B0F2-11AE32B43494}" type="slidenum">
+              <a:rPr lang="en-GB" smtClean="0"/>
+              <a:t>7</a:t>
+            </a:fld>
+            <a:endParaRPr lang="en-GB"/>
+          </a:p>
+        </p:txBody>
+      </p:sp>
+    </p:spTree>
+    <p:extLst>
+      <p:ext uri="{BB962C8B-B14F-4D97-AF65-F5344CB8AC3E}">
+        <p14:creationId xmlns:p14="http://schemas.microsoft.com/office/powerpoint/2010/main" val="2751177953"/>
       </p:ext>
     </p:extLst>
   </p:cSld>
@@ -4543,7 +4713,7 @@
           <a:p>
             <a:fld id="{596B1921-B6CA-4D11-B318-D7AC0C0445B6}" type="datetimeFigureOut">
               <a:rPr lang="en-GB" smtClean="0"/>
-              <a:t>09/07/2020</a:t>
+              <a:t>10/07/2020</a:t>
             </a:fld>
             <a:endParaRPr lang="en-GB"/>
           </a:p>
@@ -4794,7 +4964,7 @@
           <a:p>
             <a:fld id="{596B1921-B6CA-4D11-B318-D7AC0C0445B6}" type="datetimeFigureOut">
               <a:rPr lang="en-GB" smtClean="0"/>
-              <a:t>09/07/2020</a:t>
+              <a:t>10/07/2020</a:t>
             </a:fld>
             <a:endParaRPr lang="en-GB"/>
           </a:p>
@@ -5108,7 +5278,7 @@
           <a:p>
             <a:fld id="{596B1921-B6CA-4D11-B318-D7AC0C0445B6}" type="datetimeFigureOut">
               <a:rPr lang="en-GB" smtClean="0"/>
-              <a:t>09/07/2020</a:t>
+              <a:t>10/07/2020</a:t>
             </a:fld>
             <a:endParaRPr lang="en-GB"/>
           </a:p>
@@ -5449,7 +5619,7 @@
           <a:p>
             <a:fld id="{596B1921-B6CA-4D11-B318-D7AC0C0445B6}" type="datetimeFigureOut">
               <a:rPr lang="en-GB" smtClean="0"/>
-              <a:t>09/07/2020</a:t>
+              <a:t>10/07/2020</a:t>
             </a:fld>
             <a:endParaRPr lang="en-GB"/>
           </a:p>
@@ -5763,7 +5933,7 @@
           <a:p>
             <a:fld id="{596B1921-B6CA-4D11-B318-D7AC0C0445B6}" type="datetimeFigureOut">
               <a:rPr lang="en-GB" smtClean="0"/>
-              <a:t>09/07/2020</a:t>
+              <a:t>10/07/2020</a:t>
             </a:fld>
             <a:endParaRPr lang="en-GB"/>
           </a:p>
@@ -6156,7 +6326,7 @@
           <a:p>
             <a:fld id="{596B1921-B6CA-4D11-B318-D7AC0C0445B6}" type="datetimeFigureOut">
               <a:rPr lang="en-GB" smtClean="0"/>
-              <a:t>09/07/2020</a:t>
+              <a:t>10/07/2020</a:t>
             </a:fld>
             <a:endParaRPr lang="en-GB"/>
           </a:p>
@@ -6326,7 +6496,7 @@
           <a:p>
             <a:fld id="{596B1921-B6CA-4D11-B318-D7AC0C0445B6}" type="datetimeFigureOut">
               <a:rPr lang="en-GB" smtClean="0"/>
-              <a:t>09/07/2020</a:t>
+              <a:t>10/07/2020</a:t>
             </a:fld>
             <a:endParaRPr lang="en-GB"/>
           </a:p>
@@ -6506,7 +6676,7 @@
           <a:p>
             <a:fld id="{596B1921-B6CA-4D11-B318-D7AC0C0445B6}" type="datetimeFigureOut">
               <a:rPr lang="en-GB" smtClean="0"/>
-              <a:t>09/07/2020</a:t>
+              <a:t>10/07/2020</a:t>
             </a:fld>
             <a:endParaRPr lang="en-GB"/>
           </a:p>
@@ -6682,7 +6852,7 @@
           <a:p>
             <a:fld id="{596B1921-B6CA-4D11-B318-D7AC0C0445B6}" type="datetimeFigureOut">
               <a:rPr lang="en-GB" smtClean="0"/>
-              <a:t>09/07/2020</a:t>
+              <a:t>10/07/2020</a:t>
             </a:fld>
             <a:endParaRPr lang="en-GB"/>
           </a:p>
@@ -6929,7 +7099,7 @@
           <a:p>
             <a:fld id="{596B1921-B6CA-4D11-B318-D7AC0C0445B6}" type="datetimeFigureOut">
               <a:rPr lang="en-GB" smtClean="0"/>
-              <a:t>09/07/2020</a:t>
+              <a:t>10/07/2020</a:t>
             </a:fld>
             <a:endParaRPr lang="en-GB"/>
           </a:p>
@@ -7161,7 +7331,7 @@
           <a:p>
             <a:fld id="{596B1921-B6CA-4D11-B318-D7AC0C0445B6}" type="datetimeFigureOut">
               <a:rPr lang="en-GB" smtClean="0"/>
-              <a:t>09/07/2020</a:t>
+              <a:t>10/07/2020</a:t>
             </a:fld>
             <a:endParaRPr lang="en-GB"/>
           </a:p>
@@ -7535,7 +7705,7 @@
           <a:p>
             <a:fld id="{596B1921-B6CA-4D11-B318-D7AC0C0445B6}" type="datetimeFigureOut">
               <a:rPr lang="en-GB" smtClean="0"/>
-              <a:t>09/07/2020</a:t>
+              <a:t>10/07/2020</a:t>
             </a:fld>
             <a:endParaRPr lang="en-GB"/>
           </a:p>
@@ -7658,7 +7828,7 @@
           <a:p>
             <a:fld id="{596B1921-B6CA-4D11-B318-D7AC0C0445B6}" type="datetimeFigureOut">
               <a:rPr lang="en-GB" smtClean="0"/>
-              <a:t>09/07/2020</a:t>
+              <a:t>10/07/2020</a:t>
             </a:fld>
             <a:endParaRPr lang="en-GB"/>
           </a:p>
@@ -7753,7 +7923,7 @@
           <a:p>
             <a:fld id="{596B1921-B6CA-4D11-B318-D7AC0C0445B6}" type="datetimeFigureOut">
               <a:rPr lang="en-GB" smtClean="0"/>
-              <a:t>09/07/2020</a:t>
+              <a:t>10/07/2020</a:t>
             </a:fld>
             <a:endParaRPr lang="en-GB"/>
           </a:p>
@@ -8008,7 +8178,7 @@
           <a:p>
             <a:fld id="{596B1921-B6CA-4D11-B318-D7AC0C0445B6}" type="datetimeFigureOut">
               <a:rPr lang="en-GB" smtClean="0"/>
-              <a:t>09/07/2020</a:t>
+              <a:t>10/07/2020</a:t>
             </a:fld>
             <a:endParaRPr lang="en-GB"/>
           </a:p>
@@ -8271,7 +8441,7 @@
           <a:p>
             <a:fld id="{596B1921-B6CA-4D11-B318-D7AC0C0445B6}" type="datetimeFigureOut">
               <a:rPr lang="en-GB" smtClean="0"/>
-              <a:t>09/07/2020</a:t>
+              <a:t>10/07/2020</a:t>
             </a:fld>
             <a:endParaRPr lang="en-GB"/>
           </a:p>
@@ -9014,7 +9184,7 @@
           <a:p>
             <a:fld id="{596B1921-B6CA-4D11-B318-D7AC0C0445B6}" type="datetimeFigureOut">
               <a:rPr lang="en-GB" smtClean="0"/>
-              <a:t>09/07/2020</a:t>
+              <a:t>10/07/2020</a:t>
             </a:fld>
             <a:endParaRPr lang="en-GB"/>
           </a:p>
@@ -10546,19 +10716,27 @@
           <a:lstStyle/>
           <a:p>
             <a:r>
-              <a:rPr lang="en-GB">
+              <a:rPr lang="en-GB" dirty="0" err="1">
                 <a:solidFill>
                   <a:srgbClr val="FFFFFF"/>
                 </a:solidFill>
               </a:rPr>
-              <a:t>CyberFocus is a first person shooter</a:t>
+              <a:t>CyberFocus</a:t>
+            </a:r>
+            <a:r>
+              <a:rPr lang="en-GB" dirty="0">
+                <a:solidFill>
+                  <a:srgbClr val="FFFFFF"/>
+                </a:solidFill>
+              </a:rPr>
+              <a:t> is a first person shooter (FPS)</a:t>
             </a:r>
           </a:p>
           <a:p>
             <a:pPr marL="0" indent="0">
               <a:buNone/>
             </a:pPr>
-            <a:endParaRPr lang="en-GB">
+            <a:endParaRPr lang="en-GB" dirty="0">
               <a:solidFill>
                 <a:srgbClr val="FFFFFF"/>
               </a:solidFill>
@@ -10566,7 +10744,7 @@
           </a:p>
           <a:p>
             <a:r>
-              <a:rPr lang="en-GB">
+              <a:rPr lang="en-GB" dirty="0">
                 <a:solidFill>
                   <a:srgbClr val="FFFFFF"/>
                 </a:solidFill>
@@ -10578,7 +10756,7 @@
             <a:pPr marL="0" indent="0">
               <a:buNone/>
             </a:pPr>
-            <a:endParaRPr lang="en-GB">
+            <a:endParaRPr lang="en-GB" dirty="0">
               <a:solidFill>
                 <a:srgbClr val="FFFFFF"/>
               </a:solidFill>
@@ -10586,7 +10764,7 @@
           </a:p>
           <a:p>
             <a:r>
-              <a:rPr lang="en-GB">
+              <a:rPr lang="en-GB" dirty="0">
                 <a:solidFill>
                   <a:srgbClr val="FFFFFF"/>
                 </a:solidFill>
@@ -10595,7 +10773,7 @@
             </a:r>
           </a:p>
           <a:p>
-            <a:endParaRPr lang="en-GB">
+            <a:endParaRPr lang="en-GB" dirty="0">
               <a:solidFill>
                 <a:srgbClr val="FFFFFF"/>
               </a:solidFill>
@@ -12353,6 +12531,1739 @@
 </p:sld>
 </file>
 
+<file path=ppt/slides/slide6.xml><?xml version="1.0" encoding="utf-8"?>
+<p:sld xmlns:a="http://schemas.openxmlformats.org/drawingml/2006/main" xmlns:r="http://schemas.openxmlformats.org/officeDocument/2006/relationships" xmlns:p="http://schemas.openxmlformats.org/presentationml/2006/main">
+  <p:cSld>
+    <p:bg>
+      <p:bgPr>
+        <a:solidFill>
+          <a:schemeClr val="bg2"/>
+        </a:solidFill>
+        <a:effectLst/>
+      </p:bgPr>
+    </p:bg>
+    <p:spTree>
+      <p:nvGrpSpPr>
+        <p:cNvPr id="1" name=""/>
+        <p:cNvGrpSpPr/>
+        <p:nvPr/>
+      </p:nvGrpSpPr>
+      <p:grpSpPr>
+        <a:xfrm>
+          <a:off x="0" y="0"/>
+          <a:ext cx="0" cy="0"/>
+          <a:chOff x="0" y="0"/>
+          <a:chExt cx="0" cy="0"/>
+        </a:xfrm>
+      </p:grpSpPr>
+      <p:sp useBgFill="1">
+        <p:nvSpPr>
+          <p:cNvPr id="8" name="Rectangle 7">
+            <a:extLst>
+              <a:ext uri="{FF2B5EF4-FFF2-40B4-BE49-F238E27FC236}">
+                <a16:creationId xmlns:a16="http://schemas.microsoft.com/office/drawing/2014/main" id="{A65AC7D1-EAA9-48F5-B509-60A7F50BF703}"/>
+              </a:ext>
+              <a:ext uri="{C183D7F6-B498-43B3-948B-1728B52AA6E4}">
+                <adec:decorative xmlns:adec="http://schemas.microsoft.com/office/drawing/2017/decorative" val="1"/>
+              </a:ext>
+            </a:extLst>
+          </p:cNvPr>
+          <p:cNvSpPr>
+            <a:spLocks noGrp="1" noRot="1" noChangeAspect="1" noMove="1" noResize="1" noEditPoints="1" noAdjustHandles="1" noChangeArrowheads="1" noChangeShapeType="1" noTextEdit="1"/>
+          </p:cNvSpPr>
+          <p:nvPr>
+            <p:extLst>
+              <p:ext uri="{386F3935-93C4-4BCD-93E2-E3B085C9AB24}">
+                <p16:designElem xmlns:p16="http://schemas.microsoft.com/office/powerpoint/2015/main" val="1"/>
+              </p:ext>
+            </p:extLst>
+          </p:nvPr>
+        </p:nvSpPr>
+        <p:spPr>
+          <a:xfrm>
+            <a:off x="0" y="0"/>
+            <a:ext cx="12192000" cy="6858000"/>
+          </a:xfrm>
+          <a:prstGeom prst="rect">
+            <a:avLst/>
+          </a:prstGeom>
+          <a:ln>
+            <a:noFill/>
+          </a:ln>
+        </p:spPr>
+        <p:style>
+          <a:lnRef idx="2">
+            <a:schemeClr val="accent1">
+              <a:shade val="50000"/>
+            </a:schemeClr>
+          </a:lnRef>
+          <a:fillRef idx="1">
+            <a:schemeClr val="accent1"/>
+          </a:fillRef>
+          <a:effectRef idx="0">
+            <a:schemeClr val="accent1"/>
+          </a:effectRef>
+          <a:fontRef idx="minor">
+            <a:schemeClr val="lt1"/>
+          </a:fontRef>
+        </p:style>
+        <p:txBody>
+          <a:bodyPr rtlCol="0" anchor="ctr"/>
+          <a:lstStyle/>
+          <a:p>
+            <a:pPr algn="ctr"/>
+            <a:endParaRPr lang="en-US" dirty="0"/>
+          </a:p>
+        </p:txBody>
+      </p:sp>
+      <p:sp useBgFill="1">
+        <p:nvSpPr>
+          <p:cNvPr id="10" name="Rectangle 9">
+            <a:extLst>
+              <a:ext uri="{FF2B5EF4-FFF2-40B4-BE49-F238E27FC236}">
+                <a16:creationId xmlns:a16="http://schemas.microsoft.com/office/drawing/2014/main" id="{D6320AF9-619A-4175-865B-5663E1AEF4C5}"/>
+              </a:ext>
+              <a:ext uri="{C183D7F6-B498-43B3-948B-1728B52AA6E4}">
+                <adec:decorative xmlns:adec="http://schemas.microsoft.com/office/drawing/2017/decorative" val="1"/>
+              </a:ext>
+            </a:extLst>
+          </p:cNvPr>
+          <p:cNvSpPr>
+            <a:spLocks noGrp="1" noRot="1" noChangeAspect="1" noMove="1" noResize="1" noEditPoints="1" noAdjustHandles="1" noChangeArrowheads="1" noChangeShapeType="1" noTextEdit="1"/>
+          </p:cNvSpPr>
+          <p:nvPr>
+            <p:extLst>
+              <p:ext uri="{386F3935-93C4-4BCD-93E2-E3B085C9AB24}">
+                <p16:designElem xmlns:p16="http://schemas.microsoft.com/office/powerpoint/2015/main" val="1"/>
+              </p:ext>
+            </p:extLst>
+          </p:nvPr>
+        </p:nvSpPr>
+        <p:spPr>
+          <a:xfrm>
+            <a:off x="0" y="0"/>
+            <a:ext cx="12192000" cy="6858000"/>
+          </a:xfrm>
+          <a:prstGeom prst="rect">
+            <a:avLst/>
+          </a:prstGeom>
+          <a:ln>
+            <a:noFill/>
+          </a:ln>
+        </p:spPr>
+        <p:style>
+          <a:lnRef idx="2">
+            <a:schemeClr val="accent1">
+              <a:shade val="50000"/>
+            </a:schemeClr>
+          </a:lnRef>
+          <a:fillRef idx="1">
+            <a:schemeClr val="accent1"/>
+          </a:fillRef>
+          <a:effectRef idx="0">
+            <a:schemeClr val="accent1"/>
+          </a:effectRef>
+          <a:fontRef idx="minor">
+            <a:schemeClr val="lt1"/>
+          </a:fontRef>
+        </p:style>
+        <p:txBody>
+          <a:bodyPr rtlCol="0" anchor="ctr"/>
+          <a:lstStyle/>
+          <a:p>
+            <a:pPr algn="ctr"/>
+            <a:endParaRPr lang="en-US"/>
+          </a:p>
+        </p:txBody>
+      </p:sp>
+      <p:cxnSp>
+        <p:nvCxnSpPr>
+          <p:cNvPr id="12" name="Straight Connector 11">
+            <a:extLst>
+              <a:ext uri="{FF2B5EF4-FFF2-40B4-BE49-F238E27FC236}">
+                <a16:creationId xmlns:a16="http://schemas.microsoft.com/office/drawing/2014/main" id="{063B6EC6-D752-4EE7-908B-F8F19E8C7FEA}"/>
+              </a:ext>
+              <a:ext uri="{C183D7F6-B498-43B3-948B-1728B52AA6E4}">
+                <adec:decorative xmlns:adec="http://schemas.microsoft.com/office/drawing/2017/decorative" val="1"/>
+              </a:ext>
+            </a:extLst>
+          </p:cNvPr>
+          <p:cNvCxnSpPr>
+            <a:cxnSpLocks noGrp="1" noRot="1" noChangeAspect="1" noMove="1" noResize="1" noEditPoints="1" noAdjustHandles="1" noChangeArrowheads="1" noChangeShapeType="1"/>
+          </p:cNvCxnSpPr>
+          <p:nvPr>
+            <p:extLst>
+              <p:ext uri="{386F3935-93C4-4BCD-93E2-E3B085C9AB24}">
+                <p16:designElem xmlns:p16="http://schemas.microsoft.com/office/powerpoint/2015/main" val="1"/>
+              </p:ext>
+            </p:extLst>
+          </p:nvPr>
+        </p:nvCxnSpPr>
+        <p:spPr>
+          <a:xfrm>
+            <a:off x="3953376" y="0"/>
+            <a:ext cx="1219200" cy="6858000"/>
+          </a:xfrm>
+          <a:prstGeom prst="line">
+            <a:avLst/>
+          </a:prstGeom>
+          <a:ln w="9525">
+            <a:solidFill>
+              <a:schemeClr val="accent1">
+                <a:lumMod val="75000"/>
+              </a:schemeClr>
+            </a:solidFill>
+          </a:ln>
+        </p:spPr>
+        <p:style>
+          <a:lnRef idx="2">
+            <a:schemeClr val="accent1"/>
+          </a:lnRef>
+          <a:fillRef idx="0">
+            <a:schemeClr val="accent1"/>
+          </a:fillRef>
+          <a:effectRef idx="1">
+            <a:schemeClr val="accent1"/>
+          </a:effectRef>
+          <a:fontRef idx="minor">
+            <a:schemeClr val="tx1"/>
+          </a:fontRef>
+        </p:style>
+      </p:cxnSp>
+      <p:cxnSp>
+        <p:nvCxnSpPr>
+          <p:cNvPr id="14" name="Straight Connector 13">
+            <a:extLst>
+              <a:ext uri="{FF2B5EF4-FFF2-40B4-BE49-F238E27FC236}">
+                <a16:creationId xmlns:a16="http://schemas.microsoft.com/office/drawing/2014/main" id="{EFECD4E8-AD3E-4228-82A2-9461958EA94D}"/>
+              </a:ext>
+              <a:ext uri="{C183D7F6-B498-43B3-948B-1728B52AA6E4}">
+                <adec:decorative xmlns:adec="http://schemas.microsoft.com/office/drawing/2017/decorative" val="1"/>
+              </a:ext>
+            </a:extLst>
+          </p:cNvPr>
+          <p:cNvCxnSpPr>
+            <a:cxnSpLocks noGrp="1" noRot="1" noChangeAspect="1" noMove="1" noResize="1" noEditPoints="1" noAdjustHandles="1" noChangeArrowheads="1" noChangeShapeType="1"/>
+          </p:cNvCxnSpPr>
+          <p:nvPr>
+            <p:extLst>
+              <p:ext uri="{386F3935-93C4-4BCD-93E2-E3B085C9AB24}">
+                <p16:designElem xmlns:p16="http://schemas.microsoft.com/office/powerpoint/2015/main" val="1"/>
+              </p:ext>
+            </p:extLst>
+          </p:nvPr>
+        </p:nvCxnSpPr>
+        <p:spPr>
+          <a:xfrm flipH="1">
+            <a:off x="2133042" y="3681413"/>
+            <a:ext cx="4763558" cy="3176587"/>
+          </a:xfrm>
+          <a:prstGeom prst="line">
+            <a:avLst/>
+          </a:prstGeom>
+          <a:ln w="9525">
+            <a:solidFill>
+              <a:schemeClr val="tx1">
+                <a:lumMod val="50000"/>
+                <a:lumOff val="50000"/>
+                <a:alpha val="80000"/>
+              </a:schemeClr>
+            </a:solidFill>
+          </a:ln>
+        </p:spPr>
+        <p:style>
+          <a:lnRef idx="2">
+            <a:schemeClr val="accent1"/>
+          </a:lnRef>
+          <a:fillRef idx="0">
+            <a:schemeClr val="accent1"/>
+          </a:fillRef>
+          <a:effectRef idx="1">
+            <a:schemeClr val="accent1"/>
+          </a:effectRef>
+          <a:fontRef idx="minor">
+            <a:schemeClr val="tx1"/>
+          </a:fontRef>
+        </p:style>
+      </p:cxnSp>
+      <p:sp>
+        <p:nvSpPr>
+          <p:cNvPr id="16" name="Rectangle 23">
+            <a:extLst>
+              <a:ext uri="{FF2B5EF4-FFF2-40B4-BE49-F238E27FC236}">
+                <a16:creationId xmlns:a16="http://schemas.microsoft.com/office/drawing/2014/main" id="{7E018740-5C2B-4A41-AC1A-7E68D1EC1954}"/>
+              </a:ext>
+              <a:ext uri="{C183D7F6-B498-43B3-948B-1728B52AA6E4}">
+                <adec:decorative xmlns:adec="http://schemas.microsoft.com/office/drawing/2017/decorative" val="1"/>
+              </a:ext>
+            </a:extLst>
+          </p:cNvPr>
+          <p:cNvSpPr>
+            <a:spLocks noGrp="1" noRot="1" noChangeAspect="1" noMove="1" noResize="1" noEditPoints="1" noAdjustHandles="1" noChangeArrowheads="1" noChangeShapeType="1" noTextEdit="1"/>
+          </p:cNvSpPr>
+          <p:nvPr>
+            <p:extLst>
+              <p:ext uri="{386F3935-93C4-4BCD-93E2-E3B085C9AB24}">
+                <p16:designElem xmlns:p16="http://schemas.microsoft.com/office/powerpoint/2015/main" val="1"/>
+              </p:ext>
+            </p:extLst>
+          </p:nvPr>
+        </p:nvSpPr>
+        <p:spPr>
+          <a:xfrm>
+            <a:off x="3324631" y="-8467"/>
+            <a:ext cx="3007349" cy="6866467"/>
+          </a:xfrm>
+          <a:custGeom>
+            <a:avLst/>
+            <a:gdLst/>
+            <a:ahLst/>
+            <a:cxnLst/>
+            <a:rect l="l" t="t" r="r" b="b"/>
+            <a:pathLst>
+              <a:path w="3007349" h="6866467">
+                <a:moveTo>
+                  <a:pt x="2045532" y="0"/>
+                </a:moveTo>
+                <a:lnTo>
+                  <a:pt x="3007349" y="0"/>
+                </a:lnTo>
+                <a:lnTo>
+                  <a:pt x="3007349" y="6866467"/>
+                </a:lnTo>
+                <a:lnTo>
+                  <a:pt x="0" y="6866467"/>
+                </a:lnTo>
+                <a:lnTo>
+                  <a:pt x="2045532" y="0"/>
+                </a:lnTo>
+                <a:close/>
+              </a:path>
+            </a:pathLst>
+          </a:custGeom>
+          <a:solidFill>
+            <a:schemeClr val="accent1">
+              <a:alpha val="30000"/>
+            </a:schemeClr>
+          </a:solidFill>
+          <a:ln>
+            <a:noFill/>
+          </a:ln>
+          <a:effectLst/>
+        </p:spPr>
+        <p:style>
+          <a:lnRef idx="1">
+            <a:schemeClr val="accent1"/>
+          </a:lnRef>
+          <a:fillRef idx="3">
+            <a:schemeClr val="accent1"/>
+          </a:fillRef>
+          <a:effectRef idx="2">
+            <a:schemeClr val="accent1"/>
+          </a:effectRef>
+          <a:fontRef idx="minor">
+            <a:schemeClr val="lt1"/>
+          </a:fontRef>
+        </p:style>
+      </p:sp>
+      <p:sp>
+        <p:nvSpPr>
+          <p:cNvPr id="18" name="Rectangle 25">
+            <a:extLst>
+              <a:ext uri="{FF2B5EF4-FFF2-40B4-BE49-F238E27FC236}">
+                <a16:creationId xmlns:a16="http://schemas.microsoft.com/office/drawing/2014/main" id="{166F75A4-C475-4941-8EE2-B80A06A2C1BB}"/>
+              </a:ext>
+              <a:ext uri="{C183D7F6-B498-43B3-948B-1728B52AA6E4}">
+                <adec:decorative xmlns:adec="http://schemas.microsoft.com/office/drawing/2017/decorative" val="1"/>
+              </a:ext>
+            </a:extLst>
+          </p:cNvPr>
+          <p:cNvSpPr>
+            <a:spLocks noGrp="1" noRot="1" noChangeAspect="1" noMove="1" noResize="1" noEditPoints="1" noAdjustHandles="1" noChangeArrowheads="1" noChangeShapeType="1" noTextEdit="1"/>
+          </p:cNvSpPr>
+          <p:nvPr>
+            <p:extLst>
+              <p:ext uri="{386F3935-93C4-4BCD-93E2-E3B085C9AB24}">
+                <p16:designElem xmlns:p16="http://schemas.microsoft.com/office/powerpoint/2015/main" val="1"/>
+              </p:ext>
+            </p:extLst>
+          </p:nvPr>
+        </p:nvSpPr>
+        <p:spPr>
+          <a:xfrm>
+            <a:off x="3746597" y="-8467"/>
+            <a:ext cx="2588558" cy="6866467"/>
+          </a:xfrm>
+          <a:custGeom>
+            <a:avLst/>
+            <a:gdLst/>
+            <a:ahLst/>
+            <a:cxnLst/>
+            <a:rect l="l" t="t" r="r" b="b"/>
+            <a:pathLst>
+              <a:path w="2573311" h="6866467">
+                <a:moveTo>
+                  <a:pt x="0" y="0"/>
+                </a:moveTo>
+                <a:lnTo>
+                  <a:pt x="2573311" y="0"/>
+                </a:lnTo>
+                <a:lnTo>
+                  <a:pt x="2573311" y="6866467"/>
+                </a:lnTo>
+                <a:lnTo>
+                  <a:pt x="1202336" y="6866467"/>
+                </a:lnTo>
+                <a:lnTo>
+                  <a:pt x="0" y="0"/>
+                </a:lnTo>
+                <a:close/>
+              </a:path>
+            </a:pathLst>
+          </a:custGeom>
+          <a:solidFill>
+            <a:schemeClr val="accent1">
+              <a:alpha val="20000"/>
+            </a:schemeClr>
+          </a:solidFill>
+          <a:ln>
+            <a:noFill/>
+          </a:ln>
+          <a:effectLst/>
+        </p:spPr>
+        <p:style>
+          <a:lnRef idx="1">
+            <a:schemeClr val="accent1"/>
+          </a:lnRef>
+          <a:fillRef idx="3">
+            <a:schemeClr val="accent1"/>
+          </a:fillRef>
+          <a:effectRef idx="2">
+            <a:schemeClr val="accent1"/>
+          </a:effectRef>
+          <a:fontRef idx="minor">
+            <a:schemeClr val="lt1"/>
+          </a:fontRef>
+        </p:style>
+      </p:sp>
+      <p:sp>
+        <p:nvSpPr>
+          <p:cNvPr id="20" name="Isosceles Triangle 19">
+            <a:extLst>
+              <a:ext uri="{FF2B5EF4-FFF2-40B4-BE49-F238E27FC236}">
+                <a16:creationId xmlns:a16="http://schemas.microsoft.com/office/drawing/2014/main" id="{A032553A-72E8-4B0D-8405-FF9771C9AF05}"/>
+              </a:ext>
+              <a:ext uri="{C183D7F6-B498-43B3-948B-1728B52AA6E4}">
+                <adec:decorative xmlns:adec="http://schemas.microsoft.com/office/drawing/2017/decorative" val="1"/>
+              </a:ext>
+            </a:extLst>
+          </p:cNvPr>
+          <p:cNvSpPr>
+            <a:spLocks noGrp="1" noRot="1" noChangeAspect="1" noMove="1" noResize="1" noEditPoints="1" noAdjustHandles="1" noChangeArrowheads="1" noChangeShapeType="1" noTextEdit="1"/>
+          </p:cNvSpPr>
+          <p:nvPr>
+            <p:extLst>
+              <p:ext uri="{386F3935-93C4-4BCD-93E2-E3B085C9AB24}">
+                <p16:designElem xmlns:p16="http://schemas.microsoft.com/office/powerpoint/2015/main" val="1"/>
+              </p:ext>
+            </p:extLst>
+          </p:nvPr>
+        </p:nvSpPr>
+        <p:spPr>
+          <a:xfrm>
+            <a:off x="3075488" y="3048000"/>
+            <a:ext cx="3259667" cy="3810000"/>
+          </a:xfrm>
+          <a:prstGeom prst="triangle">
+            <a:avLst>
+              <a:gd name="adj" fmla="val 100000"/>
+            </a:avLst>
+          </a:prstGeom>
+          <a:solidFill>
+            <a:schemeClr val="accent2">
+              <a:alpha val="72000"/>
+            </a:schemeClr>
+          </a:solidFill>
+          <a:ln>
+            <a:noFill/>
+          </a:ln>
+          <a:effectLst/>
+        </p:spPr>
+        <p:style>
+          <a:lnRef idx="1">
+            <a:schemeClr val="accent1"/>
+          </a:lnRef>
+          <a:fillRef idx="3">
+            <a:schemeClr val="accent1"/>
+          </a:fillRef>
+          <a:effectRef idx="2">
+            <a:schemeClr val="accent1"/>
+          </a:effectRef>
+          <a:fontRef idx="minor">
+            <a:schemeClr val="lt1"/>
+          </a:fontRef>
+        </p:style>
+      </p:sp>
+      <p:sp>
+        <p:nvSpPr>
+          <p:cNvPr id="22" name="Rectangle 27">
+            <a:extLst>
+              <a:ext uri="{FF2B5EF4-FFF2-40B4-BE49-F238E27FC236}">
+                <a16:creationId xmlns:a16="http://schemas.microsoft.com/office/drawing/2014/main" id="{765800AC-C3B9-498E-87BC-29FAE4C76B21}"/>
+              </a:ext>
+              <a:ext uri="{C183D7F6-B498-43B3-948B-1728B52AA6E4}">
+                <adec:decorative xmlns:adec="http://schemas.microsoft.com/office/drawing/2017/decorative" val="1"/>
+              </a:ext>
+            </a:extLst>
+          </p:cNvPr>
+          <p:cNvSpPr>
+            <a:spLocks noGrp="1" noRot="1" noChangeAspect="1" noMove="1" noResize="1" noEditPoints="1" noAdjustHandles="1" noChangeArrowheads="1" noChangeShapeType="1" noTextEdit="1"/>
+          </p:cNvSpPr>
+          <p:nvPr>
+            <p:extLst>
+              <p:ext uri="{386F3935-93C4-4BCD-93E2-E3B085C9AB24}">
+                <p16:designElem xmlns:p16="http://schemas.microsoft.com/office/powerpoint/2015/main" val="1"/>
+              </p:ext>
+            </p:extLst>
+          </p:nvPr>
+        </p:nvSpPr>
+        <p:spPr>
+          <a:xfrm>
+            <a:off x="3477655" y="-8467"/>
+            <a:ext cx="2854326" cy="6866467"/>
+          </a:xfrm>
+          <a:custGeom>
+            <a:avLst/>
+            <a:gdLst/>
+            <a:ahLst/>
+            <a:cxnLst/>
+            <a:rect l="l" t="t" r="r" b="b"/>
+            <a:pathLst>
+              <a:path w="2858013" h="6866467">
+                <a:moveTo>
+                  <a:pt x="0" y="0"/>
+                </a:moveTo>
+                <a:lnTo>
+                  <a:pt x="2858013" y="0"/>
+                </a:lnTo>
+                <a:lnTo>
+                  <a:pt x="2858013" y="6866467"/>
+                </a:lnTo>
+                <a:lnTo>
+                  <a:pt x="2473942" y="6866467"/>
+                </a:lnTo>
+                <a:lnTo>
+                  <a:pt x="0" y="0"/>
+                </a:lnTo>
+                <a:close/>
+              </a:path>
+            </a:pathLst>
+          </a:custGeom>
+          <a:solidFill>
+            <a:schemeClr val="accent2">
+              <a:lumMod val="75000"/>
+              <a:alpha val="70000"/>
+            </a:schemeClr>
+          </a:solidFill>
+          <a:ln>
+            <a:noFill/>
+          </a:ln>
+          <a:effectLst/>
+        </p:spPr>
+        <p:style>
+          <a:lnRef idx="1">
+            <a:schemeClr val="accent1"/>
+          </a:lnRef>
+          <a:fillRef idx="3">
+            <a:schemeClr val="accent1"/>
+          </a:fillRef>
+          <a:effectRef idx="2">
+            <a:schemeClr val="accent1"/>
+          </a:effectRef>
+          <a:fontRef idx="minor">
+            <a:schemeClr val="lt1"/>
+          </a:fontRef>
+        </p:style>
+      </p:sp>
+      <p:sp>
+        <p:nvSpPr>
+          <p:cNvPr id="24" name="Isosceles Triangle 23">
+            <a:extLst>
+              <a:ext uri="{FF2B5EF4-FFF2-40B4-BE49-F238E27FC236}">
+                <a16:creationId xmlns:a16="http://schemas.microsoft.com/office/drawing/2014/main" id="{1F9D6ACB-2FF4-49F9-978A-E0D5327FC635}"/>
+              </a:ext>
+              <a:ext uri="{C183D7F6-B498-43B3-948B-1728B52AA6E4}">
+                <adec:decorative xmlns:adec="http://schemas.microsoft.com/office/drawing/2017/decorative" val="1"/>
+              </a:ext>
+            </a:extLst>
+          </p:cNvPr>
+          <p:cNvSpPr>
+            <a:spLocks noGrp="1" noRot="1" noChangeAspect="1" noMove="1" noResize="1" noEditPoints="1" noAdjustHandles="1" noChangeArrowheads="1" noChangeShapeType="1" noTextEdit="1"/>
+          </p:cNvSpPr>
+          <p:nvPr>
+            <p:extLst>
+              <p:ext uri="{386F3935-93C4-4BCD-93E2-E3B085C9AB24}">
+                <p16:designElem xmlns:p16="http://schemas.microsoft.com/office/powerpoint/2015/main" val="1"/>
+              </p:ext>
+            </p:extLst>
+          </p:nvPr>
+        </p:nvSpPr>
+        <p:spPr>
+          <a:xfrm>
+            <a:off x="4514821" y="3589867"/>
+            <a:ext cx="1817159" cy="3268133"/>
+          </a:xfrm>
+          <a:prstGeom prst="triangle">
+            <a:avLst>
+              <a:gd name="adj" fmla="val 100000"/>
+            </a:avLst>
+          </a:prstGeom>
+          <a:solidFill>
+            <a:schemeClr val="accent1">
+              <a:alpha val="80000"/>
+            </a:schemeClr>
+          </a:solidFill>
+          <a:ln>
+            <a:noFill/>
+          </a:ln>
+          <a:effectLst/>
+        </p:spPr>
+        <p:style>
+          <a:lnRef idx="1">
+            <a:schemeClr val="accent1"/>
+          </a:lnRef>
+          <a:fillRef idx="3">
+            <a:schemeClr val="accent1"/>
+          </a:fillRef>
+          <a:effectRef idx="2">
+            <a:schemeClr val="accent1"/>
+          </a:effectRef>
+          <a:fontRef idx="minor">
+            <a:schemeClr val="lt1"/>
+          </a:fontRef>
+        </p:style>
+      </p:sp>
+      <p:sp>
+        <p:nvSpPr>
+          <p:cNvPr id="2" name="Title 1">
+            <a:extLst>
+              <a:ext uri="{FF2B5EF4-FFF2-40B4-BE49-F238E27FC236}">
+                <a16:creationId xmlns:a16="http://schemas.microsoft.com/office/drawing/2014/main" id="{74004726-8898-4AD9-9118-C5A13961BF43}"/>
+              </a:ext>
+            </a:extLst>
+          </p:cNvPr>
+          <p:cNvSpPr>
+            <a:spLocks noGrp="1"/>
+          </p:cNvSpPr>
+          <p:nvPr>
+            <p:ph type="title"/>
+          </p:nvPr>
+        </p:nvSpPr>
+        <p:spPr>
+          <a:xfrm>
+            <a:off x="677334" y="609600"/>
+            <a:ext cx="4874130" cy="5175624"/>
+          </a:xfrm>
+        </p:spPr>
+        <p:txBody>
+          <a:bodyPr anchor="ctr">
+            <a:normAutofit/>
+          </a:bodyPr>
+          <a:lstStyle/>
+          <a:p>
+            <a:r>
+              <a:rPr lang="en-GB" dirty="0">
+                <a:solidFill>
+                  <a:schemeClr val="tx1">
+                    <a:lumMod val="85000"/>
+                    <a:lumOff val="15000"/>
+                  </a:schemeClr>
+                </a:solidFill>
+              </a:rPr>
+              <a:t>Why is is it fun?</a:t>
+            </a:r>
+          </a:p>
+        </p:txBody>
+      </p:sp>
+      <p:sp>
+        <p:nvSpPr>
+          <p:cNvPr id="26" name="Freeform: Shape 25">
+            <a:extLst>
+              <a:ext uri="{FF2B5EF4-FFF2-40B4-BE49-F238E27FC236}">
+                <a16:creationId xmlns:a16="http://schemas.microsoft.com/office/drawing/2014/main" id="{142BFA2A-77A0-4F60-A32A-685681C84889}"/>
+              </a:ext>
+              <a:ext uri="{C183D7F6-B498-43B3-948B-1728B52AA6E4}">
+                <adec:decorative xmlns:adec="http://schemas.microsoft.com/office/drawing/2017/decorative" val="1"/>
+              </a:ext>
+            </a:extLst>
+          </p:cNvPr>
+          <p:cNvSpPr>
+            <a:spLocks noGrp="1" noRot="1" noChangeAspect="1" noMove="1" noResize="1" noEditPoints="1" noAdjustHandles="1" noChangeArrowheads="1" noChangeShapeType="1" noTextEdit="1"/>
+          </p:cNvSpPr>
+          <p:nvPr>
+            <p:extLst>
+              <p:ext uri="{386F3935-93C4-4BCD-93E2-E3B085C9AB24}">
+                <p16:designElem xmlns:p16="http://schemas.microsoft.com/office/powerpoint/2015/main" val="1"/>
+              </p:ext>
+            </p:extLst>
+          </p:nvPr>
+        </p:nvSpPr>
+        <p:spPr>
+          <a:xfrm>
+            <a:off x="5082154" y="-8467"/>
+            <a:ext cx="7109846" cy="6866467"/>
+          </a:xfrm>
+          <a:custGeom>
+            <a:avLst/>
+            <a:gdLst>
+              <a:gd name="connsiteX0" fmla="*/ 0 w 7109846"/>
+              <a:gd name="connsiteY0" fmla="*/ 0 h 6866467"/>
+              <a:gd name="connsiteX1" fmla="*/ 1249825 w 7109846"/>
+              <a:gd name="connsiteY1" fmla="*/ 0 h 6866467"/>
+              <a:gd name="connsiteX2" fmla="*/ 1249825 w 7109846"/>
+              <a:gd name="connsiteY2" fmla="*/ 8467 h 6866467"/>
+              <a:gd name="connsiteX3" fmla="*/ 7109846 w 7109846"/>
+              <a:gd name="connsiteY3" fmla="*/ 8467 h 6866467"/>
+              <a:gd name="connsiteX4" fmla="*/ 7109846 w 7109846"/>
+              <a:gd name="connsiteY4" fmla="*/ 6866467 h 6866467"/>
+              <a:gd name="connsiteX5" fmla="*/ 1249825 w 7109846"/>
+              <a:gd name="connsiteY5" fmla="*/ 6866467 h 6866467"/>
+              <a:gd name="connsiteX6" fmla="*/ 1109382 w 7109846"/>
+              <a:gd name="connsiteY6" fmla="*/ 6866467 h 6866467"/>
+            </a:gdLst>
+            <a:ahLst/>
+            <a:cxnLst>
+              <a:cxn ang="0">
+                <a:pos x="connsiteX0" y="connsiteY0"/>
+              </a:cxn>
+              <a:cxn ang="0">
+                <a:pos x="connsiteX1" y="connsiteY1"/>
+              </a:cxn>
+              <a:cxn ang="0">
+                <a:pos x="connsiteX2" y="connsiteY2"/>
+              </a:cxn>
+              <a:cxn ang="0">
+                <a:pos x="connsiteX3" y="connsiteY3"/>
+              </a:cxn>
+              <a:cxn ang="0">
+                <a:pos x="connsiteX4" y="connsiteY4"/>
+              </a:cxn>
+              <a:cxn ang="0">
+                <a:pos x="connsiteX5" y="connsiteY5"/>
+              </a:cxn>
+              <a:cxn ang="0">
+                <a:pos x="connsiteX6" y="connsiteY6"/>
+              </a:cxn>
+            </a:cxnLst>
+            <a:rect l="l" t="t" r="r" b="b"/>
+            <a:pathLst>
+              <a:path w="7109846" h="6866467">
+                <a:moveTo>
+                  <a:pt x="0" y="0"/>
+                </a:moveTo>
+                <a:lnTo>
+                  <a:pt x="1249825" y="0"/>
+                </a:lnTo>
+                <a:lnTo>
+                  <a:pt x="1249825" y="8467"/>
+                </a:lnTo>
+                <a:lnTo>
+                  <a:pt x="7109846" y="8467"/>
+                </a:lnTo>
+                <a:lnTo>
+                  <a:pt x="7109846" y="6866467"/>
+                </a:lnTo>
+                <a:lnTo>
+                  <a:pt x="1249825" y="6866467"/>
+                </a:lnTo>
+                <a:lnTo>
+                  <a:pt x="1109382" y="6866467"/>
+                </a:lnTo>
+                <a:close/>
+              </a:path>
+            </a:pathLst>
+          </a:custGeom>
+          <a:solidFill>
+            <a:schemeClr val="accent1"/>
+          </a:solidFill>
+          <a:ln>
+            <a:noFill/>
+          </a:ln>
+        </p:spPr>
+        <p:style>
+          <a:lnRef idx="2">
+            <a:schemeClr val="accent1">
+              <a:shade val="50000"/>
+            </a:schemeClr>
+          </a:lnRef>
+          <a:fillRef idx="1">
+            <a:schemeClr val="accent1"/>
+          </a:fillRef>
+          <a:effectRef idx="0">
+            <a:schemeClr val="accent1"/>
+          </a:effectRef>
+          <a:fontRef idx="minor">
+            <a:schemeClr val="lt1"/>
+          </a:fontRef>
+        </p:style>
+        <p:txBody>
+          <a:bodyPr wrap="square" rtlCol="0" anchor="ctr">
+            <a:noAutofit/>
+          </a:bodyPr>
+          <a:lstStyle/>
+          <a:p>
+            <a:pPr algn="ctr"/>
+            <a:endParaRPr lang="en-US"/>
+          </a:p>
+        </p:txBody>
+      </p:sp>
+      <p:sp>
+        <p:nvSpPr>
+          <p:cNvPr id="3" name="Content Placeholder 2">
+            <a:extLst>
+              <a:ext uri="{FF2B5EF4-FFF2-40B4-BE49-F238E27FC236}">
+                <a16:creationId xmlns:a16="http://schemas.microsoft.com/office/drawing/2014/main" id="{F36A043C-39E7-48C7-9590-F013AE2D5BFB}"/>
+              </a:ext>
+            </a:extLst>
+          </p:cNvPr>
+          <p:cNvSpPr>
+            <a:spLocks noGrp="1"/>
+          </p:cNvSpPr>
+          <p:nvPr>
+            <p:ph idx="1"/>
+          </p:nvPr>
+        </p:nvSpPr>
+        <p:spPr>
+          <a:xfrm>
+            <a:off x="6116084" y="609601"/>
+            <a:ext cx="5511296" cy="5175624"/>
+          </a:xfrm>
+        </p:spPr>
+        <p:txBody>
+          <a:bodyPr anchor="ctr">
+            <a:normAutofit/>
+          </a:bodyPr>
+          <a:lstStyle/>
+          <a:p>
+            <a:r>
+              <a:rPr lang="en-GB" dirty="0">
+                <a:solidFill>
+                  <a:srgbClr val="FFFFFF"/>
+                </a:solidFill>
+              </a:rPr>
+              <a:t>We believe </a:t>
+            </a:r>
+            <a:r>
+              <a:rPr lang="en-GB" dirty="0" err="1">
+                <a:solidFill>
+                  <a:srgbClr val="FFFFFF"/>
+                </a:solidFill>
+              </a:rPr>
+              <a:t>CyberFocus</a:t>
+            </a:r>
+            <a:r>
+              <a:rPr lang="en-GB" dirty="0">
+                <a:solidFill>
+                  <a:srgbClr val="FFFFFF"/>
+                </a:solidFill>
+              </a:rPr>
+              <a:t> will excite players by giving them the ability to take on encounters in fun and engaging ways.</a:t>
+            </a:r>
+          </a:p>
+          <a:p>
+            <a:endParaRPr lang="en-GB" dirty="0">
+              <a:solidFill>
+                <a:srgbClr val="FFFFFF"/>
+              </a:solidFill>
+            </a:endParaRPr>
+          </a:p>
+          <a:p>
+            <a:r>
+              <a:rPr lang="en-GB" dirty="0">
+                <a:solidFill>
+                  <a:srgbClr val="FFFFFF"/>
+                </a:solidFill>
+              </a:rPr>
+              <a:t>With the ability to wall run, slow down time, parkour and shoot, players can be creative with how they want to take on enemies and manoeuvre levels.</a:t>
+            </a:r>
+          </a:p>
+        </p:txBody>
+      </p:sp>
+    </p:spTree>
+    <p:extLst>
+      <p:ext uri="{BB962C8B-B14F-4D97-AF65-F5344CB8AC3E}">
+        <p14:creationId xmlns:p14="http://schemas.microsoft.com/office/powerpoint/2010/main" val="590985362"/>
+      </p:ext>
+    </p:extLst>
+  </p:cSld>
+  <p:clrMapOvr>
+    <a:overrideClrMapping bg1="dk1" tx1="lt1" bg2="dk2" tx2="lt2" accent1="accent1" accent2="accent2" accent3="accent3" accent4="accent4" accent5="accent5" accent6="accent6" hlink="hlink" folHlink="folHlink"/>
+  </p:clrMapOvr>
+</p:sld>
+</file>
+
+<file path=ppt/slides/slide7.xml><?xml version="1.0" encoding="utf-8"?>
+<p:sld xmlns:a="http://schemas.openxmlformats.org/drawingml/2006/main" xmlns:r="http://schemas.openxmlformats.org/officeDocument/2006/relationships" xmlns:p="http://schemas.openxmlformats.org/presentationml/2006/main">
+  <p:cSld>
+    <p:bg>
+      <p:bgPr>
+        <a:solidFill>
+          <a:schemeClr val="bg2"/>
+        </a:solidFill>
+        <a:effectLst/>
+      </p:bgPr>
+    </p:bg>
+    <p:spTree>
+      <p:nvGrpSpPr>
+        <p:cNvPr id="1" name=""/>
+        <p:cNvGrpSpPr/>
+        <p:nvPr/>
+      </p:nvGrpSpPr>
+      <p:grpSpPr>
+        <a:xfrm>
+          <a:off x="0" y="0"/>
+          <a:ext cx="0" cy="0"/>
+          <a:chOff x="0" y="0"/>
+          <a:chExt cx="0" cy="0"/>
+        </a:xfrm>
+      </p:grpSpPr>
+      <p:sp useBgFill="1">
+        <p:nvSpPr>
+          <p:cNvPr id="8" name="Rectangle 7">
+            <a:extLst>
+              <a:ext uri="{FF2B5EF4-FFF2-40B4-BE49-F238E27FC236}">
+                <a16:creationId xmlns:a16="http://schemas.microsoft.com/office/drawing/2014/main" id="{A65AC7D1-EAA9-48F5-B509-60A7F50BF703}"/>
+              </a:ext>
+              <a:ext uri="{C183D7F6-B498-43B3-948B-1728B52AA6E4}">
+                <adec:decorative xmlns:adec="http://schemas.microsoft.com/office/drawing/2017/decorative" val="1"/>
+              </a:ext>
+            </a:extLst>
+          </p:cNvPr>
+          <p:cNvSpPr>
+            <a:spLocks noGrp="1" noRot="1" noChangeAspect="1" noMove="1" noResize="1" noEditPoints="1" noAdjustHandles="1" noChangeArrowheads="1" noChangeShapeType="1" noTextEdit="1"/>
+          </p:cNvSpPr>
+          <p:nvPr>
+            <p:extLst>
+              <p:ext uri="{386F3935-93C4-4BCD-93E2-E3B085C9AB24}">
+                <p16:designElem xmlns:p16="http://schemas.microsoft.com/office/powerpoint/2015/main" val="1"/>
+              </p:ext>
+            </p:extLst>
+          </p:nvPr>
+        </p:nvSpPr>
+        <p:spPr>
+          <a:xfrm>
+            <a:off x="0" y="0"/>
+            <a:ext cx="12192000" cy="6858000"/>
+          </a:xfrm>
+          <a:prstGeom prst="rect">
+            <a:avLst/>
+          </a:prstGeom>
+          <a:ln>
+            <a:noFill/>
+          </a:ln>
+        </p:spPr>
+        <p:style>
+          <a:lnRef idx="2">
+            <a:schemeClr val="accent1">
+              <a:shade val="50000"/>
+            </a:schemeClr>
+          </a:lnRef>
+          <a:fillRef idx="1">
+            <a:schemeClr val="accent1"/>
+          </a:fillRef>
+          <a:effectRef idx="0">
+            <a:schemeClr val="accent1"/>
+          </a:effectRef>
+          <a:fontRef idx="minor">
+            <a:schemeClr val="lt1"/>
+          </a:fontRef>
+        </p:style>
+        <p:txBody>
+          <a:bodyPr rtlCol="0" anchor="ctr"/>
+          <a:lstStyle/>
+          <a:p>
+            <a:pPr algn="ctr"/>
+            <a:endParaRPr lang="en-US" dirty="0"/>
+          </a:p>
+        </p:txBody>
+      </p:sp>
+      <p:sp useBgFill="1">
+        <p:nvSpPr>
+          <p:cNvPr id="10" name="Rectangle 9">
+            <a:extLst>
+              <a:ext uri="{FF2B5EF4-FFF2-40B4-BE49-F238E27FC236}">
+                <a16:creationId xmlns:a16="http://schemas.microsoft.com/office/drawing/2014/main" id="{D6320AF9-619A-4175-865B-5663E1AEF4C5}"/>
+              </a:ext>
+              <a:ext uri="{C183D7F6-B498-43B3-948B-1728B52AA6E4}">
+                <adec:decorative xmlns:adec="http://schemas.microsoft.com/office/drawing/2017/decorative" val="1"/>
+              </a:ext>
+            </a:extLst>
+          </p:cNvPr>
+          <p:cNvSpPr>
+            <a:spLocks noGrp="1" noRot="1" noChangeAspect="1" noMove="1" noResize="1" noEditPoints="1" noAdjustHandles="1" noChangeArrowheads="1" noChangeShapeType="1" noTextEdit="1"/>
+          </p:cNvSpPr>
+          <p:nvPr>
+            <p:extLst>
+              <p:ext uri="{386F3935-93C4-4BCD-93E2-E3B085C9AB24}">
+                <p16:designElem xmlns:p16="http://schemas.microsoft.com/office/powerpoint/2015/main" val="1"/>
+              </p:ext>
+            </p:extLst>
+          </p:nvPr>
+        </p:nvSpPr>
+        <p:spPr>
+          <a:xfrm>
+            <a:off x="0" y="0"/>
+            <a:ext cx="12192000" cy="6858000"/>
+          </a:xfrm>
+          <a:prstGeom prst="rect">
+            <a:avLst/>
+          </a:prstGeom>
+          <a:ln>
+            <a:noFill/>
+          </a:ln>
+        </p:spPr>
+        <p:style>
+          <a:lnRef idx="2">
+            <a:schemeClr val="accent1">
+              <a:shade val="50000"/>
+            </a:schemeClr>
+          </a:lnRef>
+          <a:fillRef idx="1">
+            <a:schemeClr val="accent1"/>
+          </a:fillRef>
+          <a:effectRef idx="0">
+            <a:schemeClr val="accent1"/>
+          </a:effectRef>
+          <a:fontRef idx="minor">
+            <a:schemeClr val="lt1"/>
+          </a:fontRef>
+        </p:style>
+        <p:txBody>
+          <a:bodyPr rtlCol="0" anchor="ctr"/>
+          <a:lstStyle/>
+          <a:p>
+            <a:pPr algn="ctr"/>
+            <a:endParaRPr lang="en-US"/>
+          </a:p>
+        </p:txBody>
+      </p:sp>
+      <p:cxnSp>
+        <p:nvCxnSpPr>
+          <p:cNvPr id="12" name="Straight Connector 11">
+            <a:extLst>
+              <a:ext uri="{FF2B5EF4-FFF2-40B4-BE49-F238E27FC236}">
+                <a16:creationId xmlns:a16="http://schemas.microsoft.com/office/drawing/2014/main" id="{063B6EC6-D752-4EE7-908B-F8F19E8C7FEA}"/>
+              </a:ext>
+              <a:ext uri="{C183D7F6-B498-43B3-948B-1728B52AA6E4}">
+                <adec:decorative xmlns:adec="http://schemas.microsoft.com/office/drawing/2017/decorative" val="1"/>
+              </a:ext>
+            </a:extLst>
+          </p:cNvPr>
+          <p:cNvCxnSpPr>
+            <a:cxnSpLocks noGrp="1" noRot="1" noChangeAspect="1" noMove="1" noResize="1" noEditPoints="1" noAdjustHandles="1" noChangeArrowheads="1" noChangeShapeType="1"/>
+          </p:cNvCxnSpPr>
+          <p:nvPr>
+            <p:extLst>
+              <p:ext uri="{386F3935-93C4-4BCD-93E2-E3B085C9AB24}">
+                <p16:designElem xmlns:p16="http://schemas.microsoft.com/office/powerpoint/2015/main" val="1"/>
+              </p:ext>
+            </p:extLst>
+          </p:nvPr>
+        </p:nvCxnSpPr>
+        <p:spPr>
+          <a:xfrm>
+            <a:off x="3953376" y="0"/>
+            <a:ext cx="1219200" cy="6858000"/>
+          </a:xfrm>
+          <a:prstGeom prst="line">
+            <a:avLst/>
+          </a:prstGeom>
+          <a:ln w="9525">
+            <a:solidFill>
+              <a:schemeClr val="accent1">
+                <a:lumMod val="75000"/>
+              </a:schemeClr>
+            </a:solidFill>
+          </a:ln>
+        </p:spPr>
+        <p:style>
+          <a:lnRef idx="2">
+            <a:schemeClr val="accent1"/>
+          </a:lnRef>
+          <a:fillRef idx="0">
+            <a:schemeClr val="accent1"/>
+          </a:fillRef>
+          <a:effectRef idx="1">
+            <a:schemeClr val="accent1"/>
+          </a:effectRef>
+          <a:fontRef idx="minor">
+            <a:schemeClr val="tx1"/>
+          </a:fontRef>
+        </p:style>
+      </p:cxnSp>
+      <p:cxnSp>
+        <p:nvCxnSpPr>
+          <p:cNvPr id="14" name="Straight Connector 13">
+            <a:extLst>
+              <a:ext uri="{FF2B5EF4-FFF2-40B4-BE49-F238E27FC236}">
+                <a16:creationId xmlns:a16="http://schemas.microsoft.com/office/drawing/2014/main" id="{EFECD4E8-AD3E-4228-82A2-9461958EA94D}"/>
+              </a:ext>
+              <a:ext uri="{C183D7F6-B498-43B3-948B-1728B52AA6E4}">
+                <adec:decorative xmlns:adec="http://schemas.microsoft.com/office/drawing/2017/decorative" val="1"/>
+              </a:ext>
+            </a:extLst>
+          </p:cNvPr>
+          <p:cNvCxnSpPr>
+            <a:cxnSpLocks noGrp="1" noRot="1" noChangeAspect="1" noMove="1" noResize="1" noEditPoints="1" noAdjustHandles="1" noChangeArrowheads="1" noChangeShapeType="1"/>
+          </p:cNvCxnSpPr>
+          <p:nvPr>
+            <p:extLst>
+              <p:ext uri="{386F3935-93C4-4BCD-93E2-E3B085C9AB24}">
+                <p16:designElem xmlns:p16="http://schemas.microsoft.com/office/powerpoint/2015/main" val="1"/>
+              </p:ext>
+            </p:extLst>
+          </p:nvPr>
+        </p:nvCxnSpPr>
+        <p:spPr>
+          <a:xfrm flipH="1">
+            <a:off x="2133042" y="3681413"/>
+            <a:ext cx="4763558" cy="3176587"/>
+          </a:xfrm>
+          <a:prstGeom prst="line">
+            <a:avLst/>
+          </a:prstGeom>
+          <a:ln w="9525">
+            <a:solidFill>
+              <a:schemeClr val="tx1">
+                <a:lumMod val="50000"/>
+                <a:lumOff val="50000"/>
+                <a:alpha val="80000"/>
+              </a:schemeClr>
+            </a:solidFill>
+          </a:ln>
+        </p:spPr>
+        <p:style>
+          <a:lnRef idx="2">
+            <a:schemeClr val="accent1"/>
+          </a:lnRef>
+          <a:fillRef idx="0">
+            <a:schemeClr val="accent1"/>
+          </a:fillRef>
+          <a:effectRef idx="1">
+            <a:schemeClr val="accent1"/>
+          </a:effectRef>
+          <a:fontRef idx="minor">
+            <a:schemeClr val="tx1"/>
+          </a:fontRef>
+        </p:style>
+      </p:cxnSp>
+      <p:sp>
+        <p:nvSpPr>
+          <p:cNvPr id="16" name="Rectangle 23">
+            <a:extLst>
+              <a:ext uri="{FF2B5EF4-FFF2-40B4-BE49-F238E27FC236}">
+                <a16:creationId xmlns:a16="http://schemas.microsoft.com/office/drawing/2014/main" id="{7E018740-5C2B-4A41-AC1A-7E68D1EC1954}"/>
+              </a:ext>
+              <a:ext uri="{C183D7F6-B498-43B3-948B-1728B52AA6E4}">
+                <adec:decorative xmlns:adec="http://schemas.microsoft.com/office/drawing/2017/decorative" val="1"/>
+              </a:ext>
+            </a:extLst>
+          </p:cNvPr>
+          <p:cNvSpPr>
+            <a:spLocks noGrp="1" noRot="1" noChangeAspect="1" noMove="1" noResize="1" noEditPoints="1" noAdjustHandles="1" noChangeArrowheads="1" noChangeShapeType="1" noTextEdit="1"/>
+          </p:cNvSpPr>
+          <p:nvPr>
+            <p:extLst>
+              <p:ext uri="{386F3935-93C4-4BCD-93E2-E3B085C9AB24}">
+                <p16:designElem xmlns:p16="http://schemas.microsoft.com/office/powerpoint/2015/main" val="1"/>
+              </p:ext>
+            </p:extLst>
+          </p:nvPr>
+        </p:nvSpPr>
+        <p:spPr>
+          <a:xfrm>
+            <a:off x="3324631" y="-8467"/>
+            <a:ext cx="3007349" cy="6866467"/>
+          </a:xfrm>
+          <a:custGeom>
+            <a:avLst/>
+            <a:gdLst/>
+            <a:ahLst/>
+            <a:cxnLst/>
+            <a:rect l="l" t="t" r="r" b="b"/>
+            <a:pathLst>
+              <a:path w="3007349" h="6866467">
+                <a:moveTo>
+                  <a:pt x="2045532" y="0"/>
+                </a:moveTo>
+                <a:lnTo>
+                  <a:pt x="3007349" y="0"/>
+                </a:lnTo>
+                <a:lnTo>
+                  <a:pt x="3007349" y="6866467"/>
+                </a:lnTo>
+                <a:lnTo>
+                  <a:pt x="0" y="6866467"/>
+                </a:lnTo>
+                <a:lnTo>
+                  <a:pt x="2045532" y="0"/>
+                </a:lnTo>
+                <a:close/>
+              </a:path>
+            </a:pathLst>
+          </a:custGeom>
+          <a:solidFill>
+            <a:schemeClr val="accent1">
+              <a:alpha val="30000"/>
+            </a:schemeClr>
+          </a:solidFill>
+          <a:ln>
+            <a:noFill/>
+          </a:ln>
+          <a:effectLst/>
+        </p:spPr>
+        <p:style>
+          <a:lnRef idx="1">
+            <a:schemeClr val="accent1"/>
+          </a:lnRef>
+          <a:fillRef idx="3">
+            <a:schemeClr val="accent1"/>
+          </a:fillRef>
+          <a:effectRef idx="2">
+            <a:schemeClr val="accent1"/>
+          </a:effectRef>
+          <a:fontRef idx="minor">
+            <a:schemeClr val="lt1"/>
+          </a:fontRef>
+        </p:style>
+      </p:sp>
+      <p:sp>
+        <p:nvSpPr>
+          <p:cNvPr id="18" name="Rectangle 25">
+            <a:extLst>
+              <a:ext uri="{FF2B5EF4-FFF2-40B4-BE49-F238E27FC236}">
+                <a16:creationId xmlns:a16="http://schemas.microsoft.com/office/drawing/2014/main" id="{166F75A4-C475-4941-8EE2-B80A06A2C1BB}"/>
+              </a:ext>
+              <a:ext uri="{C183D7F6-B498-43B3-948B-1728B52AA6E4}">
+                <adec:decorative xmlns:adec="http://schemas.microsoft.com/office/drawing/2017/decorative" val="1"/>
+              </a:ext>
+            </a:extLst>
+          </p:cNvPr>
+          <p:cNvSpPr>
+            <a:spLocks noGrp="1" noRot="1" noChangeAspect="1" noMove="1" noResize="1" noEditPoints="1" noAdjustHandles="1" noChangeArrowheads="1" noChangeShapeType="1" noTextEdit="1"/>
+          </p:cNvSpPr>
+          <p:nvPr>
+            <p:extLst>
+              <p:ext uri="{386F3935-93C4-4BCD-93E2-E3B085C9AB24}">
+                <p16:designElem xmlns:p16="http://schemas.microsoft.com/office/powerpoint/2015/main" val="1"/>
+              </p:ext>
+            </p:extLst>
+          </p:nvPr>
+        </p:nvSpPr>
+        <p:spPr>
+          <a:xfrm>
+            <a:off x="3746597" y="-8467"/>
+            <a:ext cx="2588558" cy="6866467"/>
+          </a:xfrm>
+          <a:custGeom>
+            <a:avLst/>
+            <a:gdLst/>
+            <a:ahLst/>
+            <a:cxnLst/>
+            <a:rect l="l" t="t" r="r" b="b"/>
+            <a:pathLst>
+              <a:path w="2573311" h="6866467">
+                <a:moveTo>
+                  <a:pt x="0" y="0"/>
+                </a:moveTo>
+                <a:lnTo>
+                  <a:pt x="2573311" y="0"/>
+                </a:lnTo>
+                <a:lnTo>
+                  <a:pt x="2573311" y="6866467"/>
+                </a:lnTo>
+                <a:lnTo>
+                  <a:pt x="1202336" y="6866467"/>
+                </a:lnTo>
+                <a:lnTo>
+                  <a:pt x="0" y="0"/>
+                </a:lnTo>
+                <a:close/>
+              </a:path>
+            </a:pathLst>
+          </a:custGeom>
+          <a:solidFill>
+            <a:schemeClr val="accent1">
+              <a:alpha val="20000"/>
+            </a:schemeClr>
+          </a:solidFill>
+          <a:ln>
+            <a:noFill/>
+          </a:ln>
+          <a:effectLst/>
+        </p:spPr>
+        <p:style>
+          <a:lnRef idx="1">
+            <a:schemeClr val="accent1"/>
+          </a:lnRef>
+          <a:fillRef idx="3">
+            <a:schemeClr val="accent1"/>
+          </a:fillRef>
+          <a:effectRef idx="2">
+            <a:schemeClr val="accent1"/>
+          </a:effectRef>
+          <a:fontRef idx="minor">
+            <a:schemeClr val="lt1"/>
+          </a:fontRef>
+        </p:style>
+      </p:sp>
+      <p:sp>
+        <p:nvSpPr>
+          <p:cNvPr id="20" name="Isosceles Triangle 19">
+            <a:extLst>
+              <a:ext uri="{FF2B5EF4-FFF2-40B4-BE49-F238E27FC236}">
+                <a16:creationId xmlns:a16="http://schemas.microsoft.com/office/drawing/2014/main" id="{A032553A-72E8-4B0D-8405-FF9771C9AF05}"/>
+              </a:ext>
+              <a:ext uri="{C183D7F6-B498-43B3-948B-1728B52AA6E4}">
+                <adec:decorative xmlns:adec="http://schemas.microsoft.com/office/drawing/2017/decorative" val="1"/>
+              </a:ext>
+            </a:extLst>
+          </p:cNvPr>
+          <p:cNvSpPr>
+            <a:spLocks noGrp="1" noRot="1" noChangeAspect="1" noMove="1" noResize="1" noEditPoints="1" noAdjustHandles="1" noChangeArrowheads="1" noChangeShapeType="1" noTextEdit="1"/>
+          </p:cNvSpPr>
+          <p:nvPr>
+            <p:extLst>
+              <p:ext uri="{386F3935-93C4-4BCD-93E2-E3B085C9AB24}">
+                <p16:designElem xmlns:p16="http://schemas.microsoft.com/office/powerpoint/2015/main" val="1"/>
+              </p:ext>
+            </p:extLst>
+          </p:nvPr>
+        </p:nvSpPr>
+        <p:spPr>
+          <a:xfrm>
+            <a:off x="3075488" y="3048000"/>
+            <a:ext cx="3259667" cy="3810000"/>
+          </a:xfrm>
+          <a:prstGeom prst="triangle">
+            <a:avLst>
+              <a:gd name="adj" fmla="val 100000"/>
+            </a:avLst>
+          </a:prstGeom>
+          <a:solidFill>
+            <a:schemeClr val="accent2">
+              <a:alpha val="72000"/>
+            </a:schemeClr>
+          </a:solidFill>
+          <a:ln>
+            <a:noFill/>
+          </a:ln>
+          <a:effectLst/>
+        </p:spPr>
+        <p:style>
+          <a:lnRef idx="1">
+            <a:schemeClr val="accent1"/>
+          </a:lnRef>
+          <a:fillRef idx="3">
+            <a:schemeClr val="accent1"/>
+          </a:fillRef>
+          <a:effectRef idx="2">
+            <a:schemeClr val="accent1"/>
+          </a:effectRef>
+          <a:fontRef idx="minor">
+            <a:schemeClr val="lt1"/>
+          </a:fontRef>
+        </p:style>
+      </p:sp>
+      <p:sp>
+        <p:nvSpPr>
+          <p:cNvPr id="22" name="Rectangle 27">
+            <a:extLst>
+              <a:ext uri="{FF2B5EF4-FFF2-40B4-BE49-F238E27FC236}">
+                <a16:creationId xmlns:a16="http://schemas.microsoft.com/office/drawing/2014/main" id="{765800AC-C3B9-498E-87BC-29FAE4C76B21}"/>
+              </a:ext>
+              <a:ext uri="{C183D7F6-B498-43B3-948B-1728B52AA6E4}">
+                <adec:decorative xmlns:adec="http://schemas.microsoft.com/office/drawing/2017/decorative" val="1"/>
+              </a:ext>
+            </a:extLst>
+          </p:cNvPr>
+          <p:cNvSpPr>
+            <a:spLocks noGrp="1" noRot="1" noChangeAspect="1" noMove="1" noResize="1" noEditPoints="1" noAdjustHandles="1" noChangeArrowheads="1" noChangeShapeType="1" noTextEdit="1"/>
+          </p:cNvSpPr>
+          <p:nvPr>
+            <p:extLst>
+              <p:ext uri="{386F3935-93C4-4BCD-93E2-E3B085C9AB24}">
+                <p16:designElem xmlns:p16="http://schemas.microsoft.com/office/powerpoint/2015/main" val="1"/>
+              </p:ext>
+            </p:extLst>
+          </p:nvPr>
+        </p:nvSpPr>
+        <p:spPr>
+          <a:xfrm>
+            <a:off x="3477655" y="-8467"/>
+            <a:ext cx="2854326" cy="6866467"/>
+          </a:xfrm>
+          <a:custGeom>
+            <a:avLst/>
+            <a:gdLst/>
+            <a:ahLst/>
+            <a:cxnLst/>
+            <a:rect l="l" t="t" r="r" b="b"/>
+            <a:pathLst>
+              <a:path w="2858013" h="6866467">
+                <a:moveTo>
+                  <a:pt x="0" y="0"/>
+                </a:moveTo>
+                <a:lnTo>
+                  <a:pt x="2858013" y="0"/>
+                </a:lnTo>
+                <a:lnTo>
+                  <a:pt x="2858013" y="6866467"/>
+                </a:lnTo>
+                <a:lnTo>
+                  <a:pt x="2473942" y="6866467"/>
+                </a:lnTo>
+                <a:lnTo>
+                  <a:pt x="0" y="0"/>
+                </a:lnTo>
+                <a:close/>
+              </a:path>
+            </a:pathLst>
+          </a:custGeom>
+          <a:solidFill>
+            <a:schemeClr val="accent2">
+              <a:lumMod val="75000"/>
+              <a:alpha val="70000"/>
+            </a:schemeClr>
+          </a:solidFill>
+          <a:ln>
+            <a:noFill/>
+          </a:ln>
+          <a:effectLst/>
+        </p:spPr>
+        <p:style>
+          <a:lnRef idx="1">
+            <a:schemeClr val="accent1"/>
+          </a:lnRef>
+          <a:fillRef idx="3">
+            <a:schemeClr val="accent1"/>
+          </a:fillRef>
+          <a:effectRef idx="2">
+            <a:schemeClr val="accent1"/>
+          </a:effectRef>
+          <a:fontRef idx="minor">
+            <a:schemeClr val="lt1"/>
+          </a:fontRef>
+        </p:style>
+      </p:sp>
+      <p:sp>
+        <p:nvSpPr>
+          <p:cNvPr id="24" name="Isosceles Triangle 23">
+            <a:extLst>
+              <a:ext uri="{FF2B5EF4-FFF2-40B4-BE49-F238E27FC236}">
+                <a16:creationId xmlns:a16="http://schemas.microsoft.com/office/drawing/2014/main" id="{1F9D6ACB-2FF4-49F9-978A-E0D5327FC635}"/>
+              </a:ext>
+              <a:ext uri="{C183D7F6-B498-43B3-948B-1728B52AA6E4}">
+                <adec:decorative xmlns:adec="http://schemas.microsoft.com/office/drawing/2017/decorative" val="1"/>
+              </a:ext>
+            </a:extLst>
+          </p:cNvPr>
+          <p:cNvSpPr>
+            <a:spLocks noGrp="1" noRot="1" noChangeAspect="1" noMove="1" noResize="1" noEditPoints="1" noAdjustHandles="1" noChangeArrowheads="1" noChangeShapeType="1" noTextEdit="1"/>
+          </p:cNvSpPr>
+          <p:nvPr>
+            <p:extLst>
+              <p:ext uri="{386F3935-93C4-4BCD-93E2-E3B085C9AB24}">
+                <p16:designElem xmlns:p16="http://schemas.microsoft.com/office/powerpoint/2015/main" val="1"/>
+              </p:ext>
+            </p:extLst>
+          </p:nvPr>
+        </p:nvSpPr>
+        <p:spPr>
+          <a:xfrm>
+            <a:off x="4514821" y="3589867"/>
+            <a:ext cx="1817159" cy="3268133"/>
+          </a:xfrm>
+          <a:prstGeom prst="triangle">
+            <a:avLst>
+              <a:gd name="adj" fmla="val 100000"/>
+            </a:avLst>
+          </a:prstGeom>
+          <a:solidFill>
+            <a:schemeClr val="accent1">
+              <a:alpha val="80000"/>
+            </a:schemeClr>
+          </a:solidFill>
+          <a:ln>
+            <a:noFill/>
+          </a:ln>
+          <a:effectLst/>
+        </p:spPr>
+        <p:style>
+          <a:lnRef idx="1">
+            <a:schemeClr val="accent1"/>
+          </a:lnRef>
+          <a:fillRef idx="3">
+            <a:schemeClr val="accent1"/>
+          </a:fillRef>
+          <a:effectRef idx="2">
+            <a:schemeClr val="accent1"/>
+          </a:effectRef>
+          <a:fontRef idx="minor">
+            <a:schemeClr val="lt1"/>
+          </a:fontRef>
+        </p:style>
+      </p:sp>
+      <p:sp>
+        <p:nvSpPr>
+          <p:cNvPr id="2" name="Title 1">
+            <a:extLst>
+              <a:ext uri="{FF2B5EF4-FFF2-40B4-BE49-F238E27FC236}">
+                <a16:creationId xmlns:a16="http://schemas.microsoft.com/office/drawing/2014/main" id="{74004726-8898-4AD9-9118-C5A13961BF43}"/>
+              </a:ext>
+            </a:extLst>
+          </p:cNvPr>
+          <p:cNvSpPr>
+            <a:spLocks noGrp="1"/>
+          </p:cNvSpPr>
+          <p:nvPr>
+            <p:ph type="title"/>
+          </p:nvPr>
+        </p:nvSpPr>
+        <p:spPr>
+          <a:xfrm>
+            <a:off x="677334" y="609600"/>
+            <a:ext cx="4874130" cy="5175624"/>
+          </a:xfrm>
+        </p:spPr>
+        <p:txBody>
+          <a:bodyPr anchor="ctr">
+            <a:normAutofit/>
+          </a:bodyPr>
+          <a:lstStyle/>
+          <a:p>
+            <a:r>
+              <a:rPr lang="en-GB" dirty="0">
+                <a:solidFill>
+                  <a:schemeClr val="tx1">
+                    <a:lumMod val="85000"/>
+                    <a:lumOff val="15000"/>
+                  </a:schemeClr>
+                </a:solidFill>
+              </a:rPr>
+              <a:t>Why would someone want to play it?</a:t>
+            </a:r>
+          </a:p>
+        </p:txBody>
+      </p:sp>
+      <p:sp>
+        <p:nvSpPr>
+          <p:cNvPr id="26" name="Freeform: Shape 25">
+            <a:extLst>
+              <a:ext uri="{FF2B5EF4-FFF2-40B4-BE49-F238E27FC236}">
+                <a16:creationId xmlns:a16="http://schemas.microsoft.com/office/drawing/2014/main" id="{142BFA2A-77A0-4F60-A32A-685681C84889}"/>
+              </a:ext>
+              <a:ext uri="{C183D7F6-B498-43B3-948B-1728B52AA6E4}">
+                <adec:decorative xmlns:adec="http://schemas.microsoft.com/office/drawing/2017/decorative" val="1"/>
+              </a:ext>
+            </a:extLst>
+          </p:cNvPr>
+          <p:cNvSpPr>
+            <a:spLocks noGrp="1" noRot="1" noChangeAspect="1" noMove="1" noResize="1" noEditPoints="1" noAdjustHandles="1" noChangeArrowheads="1" noChangeShapeType="1" noTextEdit="1"/>
+          </p:cNvSpPr>
+          <p:nvPr>
+            <p:extLst>
+              <p:ext uri="{386F3935-93C4-4BCD-93E2-E3B085C9AB24}">
+                <p16:designElem xmlns:p16="http://schemas.microsoft.com/office/powerpoint/2015/main" val="1"/>
+              </p:ext>
+            </p:extLst>
+          </p:nvPr>
+        </p:nvSpPr>
+        <p:spPr>
+          <a:xfrm>
+            <a:off x="5082154" y="-8467"/>
+            <a:ext cx="7109846" cy="6866467"/>
+          </a:xfrm>
+          <a:custGeom>
+            <a:avLst/>
+            <a:gdLst>
+              <a:gd name="connsiteX0" fmla="*/ 0 w 7109846"/>
+              <a:gd name="connsiteY0" fmla="*/ 0 h 6866467"/>
+              <a:gd name="connsiteX1" fmla="*/ 1249825 w 7109846"/>
+              <a:gd name="connsiteY1" fmla="*/ 0 h 6866467"/>
+              <a:gd name="connsiteX2" fmla="*/ 1249825 w 7109846"/>
+              <a:gd name="connsiteY2" fmla="*/ 8467 h 6866467"/>
+              <a:gd name="connsiteX3" fmla="*/ 7109846 w 7109846"/>
+              <a:gd name="connsiteY3" fmla="*/ 8467 h 6866467"/>
+              <a:gd name="connsiteX4" fmla="*/ 7109846 w 7109846"/>
+              <a:gd name="connsiteY4" fmla="*/ 6866467 h 6866467"/>
+              <a:gd name="connsiteX5" fmla="*/ 1249825 w 7109846"/>
+              <a:gd name="connsiteY5" fmla="*/ 6866467 h 6866467"/>
+              <a:gd name="connsiteX6" fmla="*/ 1109382 w 7109846"/>
+              <a:gd name="connsiteY6" fmla="*/ 6866467 h 6866467"/>
+            </a:gdLst>
+            <a:ahLst/>
+            <a:cxnLst>
+              <a:cxn ang="0">
+                <a:pos x="connsiteX0" y="connsiteY0"/>
+              </a:cxn>
+              <a:cxn ang="0">
+                <a:pos x="connsiteX1" y="connsiteY1"/>
+              </a:cxn>
+              <a:cxn ang="0">
+                <a:pos x="connsiteX2" y="connsiteY2"/>
+              </a:cxn>
+              <a:cxn ang="0">
+                <a:pos x="connsiteX3" y="connsiteY3"/>
+              </a:cxn>
+              <a:cxn ang="0">
+                <a:pos x="connsiteX4" y="connsiteY4"/>
+              </a:cxn>
+              <a:cxn ang="0">
+                <a:pos x="connsiteX5" y="connsiteY5"/>
+              </a:cxn>
+              <a:cxn ang="0">
+                <a:pos x="connsiteX6" y="connsiteY6"/>
+              </a:cxn>
+            </a:cxnLst>
+            <a:rect l="l" t="t" r="r" b="b"/>
+            <a:pathLst>
+              <a:path w="7109846" h="6866467">
+                <a:moveTo>
+                  <a:pt x="0" y="0"/>
+                </a:moveTo>
+                <a:lnTo>
+                  <a:pt x="1249825" y="0"/>
+                </a:lnTo>
+                <a:lnTo>
+                  <a:pt x="1249825" y="8467"/>
+                </a:lnTo>
+                <a:lnTo>
+                  <a:pt x="7109846" y="8467"/>
+                </a:lnTo>
+                <a:lnTo>
+                  <a:pt x="7109846" y="6866467"/>
+                </a:lnTo>
+                <a:lnTo>
+                  <a:pt x="1249825" y="6866467"/>
+                </a:lnTo>
+                <a:lnTo>
+                  <a:pt x="1109382" y="6866467"/>
+                </a:lnTo>
+                <a:close/>
+              </a:path>
+            </a:pathLst>
+          </a:custGeom>
+          <a:solidFill>
+            <a:schemeClr val="accent1"/>
+          </a:solidFill>
+          <a:ln>
+            <a:noFill/>
+          </a:ln>
+        </p:spPr>
+        <p:style>
+          <a:lnRef idx="2">
+            <a:schemeClr val="accent1">
+              <a:shade val="50000"/>
+            </a:schemeClr>
+          </a:lnRef>
+          <a:fillRef idx="1">
+            <a:schemeClr val="accent1"/>
+          </a:fillRef>
+          <a:effectRef idx="0">
+            <a:schemeClr val="accent1"/>
+          </a:effectRef>
+          <a:fontRef idx="minor">
+            <a:schemeClr val="lt1"/>
+          </a:fontRef>
+        </p:style>
+        <p:txBody>
+          <a:bodyPr wrap="square" rtlCol="0" anchor="ctr">
+            <a:noAutofit/>
+          </a:bodyPr>
+          <a:lstStyle/>
+          <a:p>
+            <a:pPr algn="ctr"/>
+            <a:endParaRPr lang="en-US"/>
+          </a:p>
+        </p:txBody>
+      </p:sp>
+      <p:sp>
+        <p:nvSpPr>
+          <p:cNvPr id="3" name="Content Placeholder 2">
+            <a:extLst>
+              <a:ext uri="{FF2B5EF4-FFF2-40B4-BE49-F238E27FC236}">
+                <a16:creationId xmlns:a16="http://schemas.microsoft.com/office/drawing/2014/main" id="{F36A043C-39E7-48C7-9590-F013AE2D5BFB}"/>
+              </a:ext>
+            </a:extLst>
+          </p:cNvPr>
+          <p:cNvSpPr>
+            <a:spLocks noGrp="1"/>
+          </p:cNvSpPr>
+          <p:nvPr>
+            <p:ph idx="1"/>
+          </p:nvPr>
+        </p:nvSpPr>
+        <p:spPr>
+          <a:xfrm>
+            <a:off x="6116084" y="609601"/>
+            <a:ext cx="5511296" cy="5175624"/>
+          </a:xfrm>
+        </p:spPr>
+        <p:txBody>
+          <a:bodyPr anchor="ctr">
+            <a:normAutofit/>
+          </a:bodyPr>
+          <a:lstStyle/>
+          <a:p>
+            <a:r>
+              <a:rPr lang="en-GB" dirty="0">
+                <a:solidFill>
+                  <a:srgbClr val="FFFFFF"/>
+                </a:solidFill>
+              </a:rPr>
+              <a:t>As it is a first person shooter, most players will feel comfortable with the controls layout as FPS are mainstream in the current gaming world. This would then attract them to play and </a:t>
+            </a:r>
+          </a:p>
+          <a:p>
+            <a:endParaRPr lang="en-GB" dirty="0">
+              <a:solidFill>
+                <a:srgbClr val="FFFFFF"/>
+              </a:solidFill>
+            </a:endParaRPr>
+          </a:p>
+          <a:p>
+            <a:r>
+              <a:rPr lang="en-GB" dirty="0">
+                <a:solidFill>
+                  <a:srgbClr val="FFFFFF"/>
+                </a:solidFill>
+              </a:rPr>
+              <a:t>We feel the game would be appealing as having a mix of gunplay with parkour and slow motion would be fun and players, may find a similarity to games such as Mirrors Edge.</a:t>
+            </a:r>
+          </a:p>
+          <a:p>
+            <a:endParaRPr lang="en-GB" dirty="0">
+              <a:solidFill>
+                <a:srgbClr val="FFFFFF"/>
+              </a:solidFill>
+            </a:endParaRPr>
+          </a:p>
+        </p:txBody>
+      </p:sp>
+    </p:spTree>
+    <p:extLst>
+      <p:ext uri="{BB962C8B-B14F-4D97-AF65-F5344CB8AC3E}">
+        <p14:creationId xmlns:p14="http://schemas.microsoft.com/office/powerpoint/2010/main" val="580221297"/>
+      </p:ext>
+    </p:extLst>
+  </p:cSld>
+  <p:clrMapOvr>
+    <a:overrideClrMapping bg1="dk1" tx1="lt1" bg2="dk2" tx2="lt2" accent1="accent1" accent2="accent2" accent3="accent3" accent4="accent4" accent5="accent5" accent6="accent6" hlink="hlink" folHlink="folHlink"/>
+  </p:clrMapOvr>
+</p:sld>
+</file>
+
 <file path=ppt/theme/theme1.xml><?xml version="1.0" encoding="utf-8"?>
 <a:theme xmlns:a="http://schemas.openxmlformats.org/drawingml/2006/main" name="Facet">
   <a:themeElements>

</xml_diff>

<commit_message>
more work on slideshow
</commit_message>
<xml_diff>
--- a/Virtual Pitch Presentation/Pitch.pptx
+++ b/Virtual Pitch Presentation/Pitch.pptx
@@ -5,16 +5,19 @@
     <p:sldMasterId id="2147483660" r:id="rId1"/>
   </p:sldMasterIdLst>
   <p:notesMasterIdLst>
-    <p:notesMasterId r:id="rId9"/>
+    <p:notesMasterId r:id="rId12"/>
   </p:notesMasterIdLst>
   <p:sldIdLst>
     <p:sldId id="256" r:id="rId2"/>
-    <p:sldId id="257" r:id="rId3"/>
-    <p:sldId id="258" r:id="rId4"/>
-    <p:sldId id="259" r:id="rId5"/>
-    <p:sldId id="260" r:id="rId6"/>
-    <p:sldId id="262" r:id="rId7"/>
-    <p:sldId id="263" r:id="rId8"/>
+    <p:sldId id="258" r:id="rId3"/>
+    <p:sldId id="259" r:id="rId4"/>
+    <p:sldId id="260" r:id="rId5"/>
+    <p:sldId id="262" r:id="rId6"/>
+    <p:sldId id="263" r:id="rId7"/>
+    <p:sldId id="264" r:id="rId8"/>
+    <p:sldId id="265" r:id="rId9"/>
+    <p:sldId id="266" r:id="rId10"/>
+    <p:sldId id="267" r:id="rId11"/>
   </p:sldIdLst>
   <p:sldSz cx="12192000" cy="6858000"/>
   <p:notesSz cx="6858000" cy="9144000"/>
@@ -3261,7 +3264,7 @@
           <a:p>
             <a:fld id="{6548716A-9AA1-4737-8475-8931B3DEA5E3}" type="datetimeFigureOut">
               <a:rPr lang="en-GB" smtClean="0"/>
-              <a:t>10/07/2020</a:t>
+              <a:t>14/07/2020</a:t>
             </a:fld>
             <a:endParaRPr lang="en-GB"/>
           </a:p>
@@ -3597,7 +3600,7 @@
           <a:p>
             <a:fld id="{A71A206B-ED20-42CE-B0F2-11AE32B43494}" type="slidenum">
               <a:rPr lang="en-GB" smtClean="0"/>
-              <a:t>3</a:t>
+              <a:t>2</a:t>
             </a:fld>
             <a:endParaRPr lang="en-GB"/>
           </a:p>
@@ -3687,7 +3690,7 @@
           <a:p>
             <a:fld id="{A71A206B-ED20-42CE-B0F2-11AE32B43494}" type="slidenum">
               <a:rPr lang="en-GB" smtClean="0"/>
-              <a:t>4</a:t>
+              <a:t>3</a:t>
             </a:fld>
             <a:endParaRPr lang="en-GB"/>
           </a:p>
@@ -3804,7 +3807,7 @@
           <a:p>
             <a:fld id="{A71A206B-ED20-42CE-B0F2-11AE32B43494}" type="slidenum">
               <a:rPr lang="en-GB" smtClean="0"/>
-              <a:t>5</a:t>
+              <a:t>4</a:t>
             </a:fld>
             <a:endParaRPr lang="en-GB"/>
           </a:p>
@@ -3888,7 +3891,7 @@
           <a:p>
             <a:fld id="{A71A206B-ED20-42CE-B0F2-11AE32B43494}" type="slidenum">
               <a:rPr lang="en-GB" smtClean="0"/>
-              <a:t>6</a:t>
+              <a:t>5</a:t>
             </a:fld>
             <a:endParaRPr lang="en-GB"/>
           </a:p>
@@ -3972,7 +3975,7 @@
           <a:p>
             <a:fld id="{A71A206B-ED20-42CE-B0F2-11AE32B43494}" type="slidenum">
               <a:rPr lang="en-GB" smtClean="0"/>
-              <a:t>7</a:t>
+              <a:t>6</a:t>
             </a:fld>
             <a:endParaRPr lang="en-GB"/>
           </a:p>
@@ -4713,7 +4716,7 @@
           <a:p>
             <a:fld id="{596B1921-B6CA-4D11-B318-D7AC0C0445B6}" type="datetimeFigureOut">
               <a:rPr lang="en-GB" smtClean="0"/>
-              <a:t>10/07/2020</a:t>
+              <a:t>14/07/2020</a:t>
             </a:fld>
             <a:endParaRPr lang="en-GB"/>
           </a:p>
@@ -4964,7 +4967,7 @@
           <a:p>
             <a:fld id="{596B1921-B6CA-4D11-B318-D7AC0C0445B6}" type="datetimeFigureOut">
               <a:rPr lang="en-GB" smtClean="0"/>
-              <a:t>10/07/2020</a:t>
+              <a:t>14/07/2020</a:t>
             </a:fld>
             <a:endParaRPr lang="en-GB"/>
           </a:p>
@@ -5278,7 +5281,7 @@
           <a:p>
             <a:fld id="{596B1921-B6CA-4D11-B318-D7AC0C0445B6}" type="datetimeFigureOut">
               <a:rPr lang="en-GB" smtClean="0"/>
-              <a:t>10/07/2020</a:t>
+              <a:t>14/07/2020</a:t>
             </a:fld>
             <a:endParaRPr lang="en-GB"/>
           </a:p>
@@ -5619,7 +5622,7 @@
           <a:p>
             <a:fld id="{596B1921-B6CA-4D11-B318-D7AC0C0445B6}" type="datetimeFigureOut">
               <a:rPr lang="en-GB" smtClean="0"/>
-              <a:t>10/07/2020</a:t>
+              <a:t>14/07/2020</a:t>
             </a:fld>
             <a:endParaRPr lang="en-GB"/>
           </a:p>
@@ -5933,7 +5936,7 @@
           <a:p>
             <a:fld id="{596B1921-B6CA-4D11-B318-D7AC0C0445B6}" type="datetimeFigureOut">
               <a:rPr lang="en-GB" smtClean="0"/>
-              <a:t>10/07/2020</a:t>
+              <a:t>14/07/2020</a:t>
             </a:fld>
             <a:endParaRPr lang="en-GB"/>
           </a:p>
@@ -6326,7 +6329,7 @@
           <a:p>
             <a:fld id="{596B1921-B6CA-4D11-B318-D7AC0C0445B6}" type="datetimeFigureOut">
               <a:rPr lang="en-GB" smtClean="0"/>
-              <a:t>10/07/2020</a:t>
+              <a:t>14/07/2020</a:t>
             </a:fld>
             <a:endParaRPr lang="en-GB"/>
           </a:p>
@@ -6496,7 +6499,7 @@
           <a:p>
             <a:fld id="{596B1921-B6CA-4D11-B318-D7AC0C0445B6}" type="datetimeFigureOut">
               <a:rPr lang="en-GB" smtClean="0"/>
-              <a:t>10/07/2020</a:t>
+              <a:t>14/07/2020</a:t>
             </a:fld>
             <a:endParaRPr lang="en-GB"/>
           </a:p>
@@ -6676,7 +6679,7 @@
           <a:p>
             <a:fld id="{596B1921-B6CA-4D11-B318-D7AC0C0445B6}" type="datetimeFigureOut">
               <a:rPr lang="en-GB" smtClean="0"/>
-              <a:t>10/07/2020</a:t>
+              <a:t>14/07/2020</a:t>
             </a:fld>
             <a:endParaRPr lang="en-GB"/>
           </a:p>
@@ -6852,7 +6855,7 @@
           <a:p>
             <a:fld id="{596B1921-B6CA-4D11-B318-D7AC0C0445B6}" type="datetimeFigureOut">
               <a:rPr lang="en-GB" smtClean="0"/>
-              <a:t>10/07/2020</a:t>
+              <a:t>14/07/2020</a:t>
             </a:fld>
             <a:endParaRPr lang="en-GB"/>
           </a:p>
@@ -7099,7 +7102,7 @@
           <a:p>
             <a:fld id="{596B1921-B6CA-4D11-B318-D7AC0C0445B6}" type="datetimeFigureOut">
               <a:rPr lang="en-GB" smtClean="0"/>
-              <a:t>10/07/2020</a:t>
+              <a:t>14/07/2020</a:t>
             </a:fld>
             <a:endParaRPr lang="en-GB"/>
           </a:p>
@@ -7331,7 +7334,7 @@
           <a:p>
             <a:fld id="{596B1921-B6CA-4D11-B318-D7AC0C0445B6}" type="datetimeFigureOut">
               <a:rPr lang="en-GB" smtClean="0"/>
-              <a:t>10/07/2020</a:t>
+              <a:t>14/07/2020</a:t>
             </a:fld>
             <a:endParaRPr lang="en-GB"/>
           </a:p>
@@ -7705,7 +7708,7 @@
           <a:p>
             <a:fld id="{596B1921-B6CA-4D11-B318-D7AC0C0445B6}" type="datetimeFigureOut">
               <a:rPr lang="en-GB" smtClean="0"/>
-              <a:t>10/07/2020</a:t>
+              <a:t>14/07/2020</a:t>
             </a:fld>
             <a:endParaRPr lang="en-GB"/>
           </a:p>
@@ -7828,7 +7831,7 @@
           <a:p>
             <a:fld id="{596B1921-B6CA-4D11-B318-D7AC0C0445B6}" type="datetimeFigureOut">
               <a:rPr lang="en-GB" smtClean="0"/>
-              <a:t>10/07/2020</a:t>
+              <a:t>14/07/2020</a:t>
             </a:fld>
             <a:endParaRPr lang="en-GB"/>
           </a:p>
@@ -7923,7 +7926,7 @@
           <a:p>
             <a:fld id="{596B1921-B6CA-4D11-B318-D7AC0C0445B6}" type="datetimeFigureOut">
               <a:rPr lang="en-GB" smtClean="0"/>
-              <a:t>10/07/2020</a:t>
+              <a:t>14/07/2020</a:t>
             </a:fld>
             <a:endParaRPr lang="en-GB"/>
           </a:p>
@@ -8178,7 +8181,7 @@
           <a:p>
             <a:fld id="{596B1921-B6CA-4D11-B318-D7AC0C0445B6}" type="datetimeFigureOut">
               <a:rPr lang="en-GB" smtClean="0"/>
-              <a:t>10/07/2020</a:t>
+              <a:t>14/07/2020</a:t>
             </a:fld>
             <a:endParaRPr lang="en-GB"/>
           </a:p>
@@ -8441,7 +8444,7 @@
           <a:p>
             <a:fld id="{596B1921-B6CA-4D11-B318-D7AC0C0445B6}" type="datetimeFigureOut">
               <a:rPr lang="en-GB" smtClean="0"/>
-              <a:t>10/07/2020</a:t>
+              <a:t>14/07/2020</a:t>
             </a:fld>
             <a:endParaRPr lang="en-GB"/>
           </a:p>
@@ -9184,7 +9187,7 @@
           <a:p>
             <a:fld id="{596B1921-B6CA-4D11-B318-D7AC0C0445B6}" type="datetimeFigureOut">
               <a:rPr lang="en-GB" smtClean="0"/>
-              <a:t>10/07/2020</a:t>
+              <a:t>14/07/2020</a:t>
             </a:fld>
             <a:endParaRPr lang="en-GB"/>
           </a:p>
@@ -9797,7 +9800,7 @@
 </p:sld>
 </file>
 
-<file path=ppt/slides/slide2.xml><?xml version="1.0" encoding="utf-8"?>
+<file path=ppt/slides/slide10.xml><?xml version="1.0" encoding="utf-8"?>
 <p:sld xmlns:a="http://schemas.openxmlformats.org/drawingml/2006/main" xmlns:r="http://schemas.openxmlformats.org/officeDocument/2006/relationships" xmlns:p="http://schemas.openxmlformats.org/presentationml/2006/main">
   <p:cSld>
     <p:spTree>
@@ -9819,7 +9822,7 @@
           <p:cNvPr id="2" name="Title 1">
             <a:extLst>
               <a:ext uri="{FF2B5EF4-FFF2-40B4-BE49-F238E27FC236}">
-                <a16:creationId xmlns:a16="http://schemas.microsoft.com/office/drawing/2014/main" id="{0B4D99F4-11F7-4148-B7E5-B2167A6DCE52}"/>
+                <a16:creationId xmlns:a16="http://schemas.microsoft.com/office/drawing/2014/main" id="{BF41A5CB-8505-42EF-B91C-63787E14E885}"/>
               </a:ext>
             </a:extLst>
           </p:cNvPr>
@@ -9837,7 +9840,7 @@
           <a:p>
             <a:r>
               <a:rPr lang="en-GB" dirty="0"/>
-              <a:t>First slides to do</a:t>
+              <a:t>Commercial sustainability</a:t>
             </a:r>
           </a:p>
         </p:txBody>
@@ -9847,7 +9850,7 @@
           <p:cNvPr id="3" name="Content Placeholder 2">
             <a:extLst>
               <a:ext uri="{FF2B5EF4-FFF2-40B4-BE49-F238E27FC236}">
-                <a16:creationId xmlns:a16="http://schemas.microsoft.com/office/drawing/2014/main" id="{6F9A4D18-99A9-4EA1-AFED-28DE572ADE9B}"/>
+                <a16:creationId xmlns:a16="http://schemas.microsoft.com/office/drawing/2014/main" id="{3D6EBD5E-85B1-43E0-8214-7BB7844F9049}"/>
               </a:ext>
             </a:extLst>
           </p:cNvPr>
@@ -9860,30 +9863,54 @@
         </p:nvSpPr>
         <p:spPr/>
         <p:txBody>
-          <a:bodyPr/>
+          <a:bodyPr>
+            <a:normAutofit lnSpcReduction="10000"/>
+          </a:bodyPr>
           <a:lstStyle/>
           <a:p>
             <a:r>
               <a:rPr lang="en-GB" dirty="0"/>
-              <a:t>What is great about it?</a:t>
+              <a:t>Be able to demonstrate that you plan to create and grow a sustainable studio post-competition. </a:t>
             </a:r>
           </a:p>
           <a:p>
             <a:r>
               <a:rPr lang="en-GB" dirty="0"/>
-              <a:t> Why does it makes sense?</a:t>
+              <a:t>• Expert knowledge of the business and the project and be able to talk at ease about all aspects. </a:t>
             </a:r>
           </a:p>
           <a:p>
             <a:r>
               <a:rPr lang="en-GB" dirty="0"/>
-              <a:t> Why is it fun? </a:t>
+              <a:t>• Financial / Commercial  </a:t>
             </a:r>
           </a:p>
           <a:p>
+            <a:pPr lvl="1"/>
             <a:r>
               <a:rPr lang="en-GB" dirty="0"/>
-              <a:t>Why would someone want to play it? </a:t>
+              <a:t>o Clear understanding of sources of finance, where you will generate income both whilst in this development phase and afterwards -  i.e. other funders, publishers, selling assets etc.  Think about life beyond the possible UK Games Fund grant fund.   </a:t>
+            </a:r>
+          </a:p>
+          <a:p>
+            <a:pPr lvl="1"/>
+            <a:r>
+              <a:rPr lang="en-GB" dirty="0"/>
+              <a:t>o Demonstrate that your budget and projected costs are realistic and in-line with publisher’s project budgets. </a:t>
+            </a:r>
+          </a:p>
+          <a:p>
+            <a:pPr lvl="1"/>
+            <a:r>
+              <a:rPr lang="en-GB" dirty="0"/>
+              <a:t>• Impact</a:t>
+            </a:r>
+          </a:p>
+          <a:p>
+            <a:pPr lvl="2"/>
+            <a:r>
+              <a:rPr lang="en-GB" dirty="0"/>
+              <a:t> o What would the impact of securing the UK Games Fund support have on your team / company? o Are there other impacts that are not purely commercial? </a:t>
             </a:r>
           </a:p>
         </p:txBody>
@@ -9891,7 +9918,7 @@
     </p:spTree>
     <p:extLst>
       <p:ext uri="{BB962C8B-B14F-4D97-AF65-F5344CB8AC3E}">
-        <p14:creationId xmlns:p14="http://schemas.microsoft.com/office/powerpoint/2010/main" val="3183090968"/>
+        <p14:creationId xmlns:p14="http://schemas.microsoft.com/office/powerpoint/2010/main" val="861706857"/>
       </p:ext>
     </p:extLst>
   </p:cSld>
@@ -9901,7 +9928,7 @@
 </p:sld>
 </file>
 
-<file path=ppt/slides/slide3.xml><?xml version="1.0" encoding="utf-8"?>
+<file path=ppt/slides/slide2.xml><?xml version="1.0" encoding="utf-8"?>
 <p:sld xmlns:a="http://schemas.openxmlformats.org/drawingml/2006/main" xmlns:r="http://schemas.openxmlformats.org/officeDocument/2006/relationships" xmlns:p="http://schemas.openxmlformats.org/presentationml/2006/main">
   <p:cSld>
     <p:bg>
@@ -10794,7 +10821,7 @@
 </p:sld>
 </file>
 
-<file path=ppt/slides/slide4.xml><?xml version="1.0" encoding="utf-8"?>
+<file path=ppt/slides/slide3.xml><?xml version="1.0" encoding="utf-8"?>
 <p:sld xmlns:a="http://schemas.openxmlformats.org/drawingml/2006/main" xmlns:r="http://schemas.openxmlformats.org/officeDocument/2006/relationships" xmlns:p="http://schemas.openxmlformats.org/presentationml/2006/main">
   <p:cSld>
     <p:bg>
@@ -11666,7 +11693,7 @@
 </p:sld>
 </file>
 
-<file path=ppt/slides/slide5.xml><?xml version="1.0" encoding="utf-8"?>
+<file path=ppt/slides/slide4.xml><?xml version="1.0" encoding="utf-8"?>
 <p:sld xmlns:a="http://schemas.openxmlformats.org/drawingml/2006/main" xmlns:r="http://schemas.openxmlformats.org/officeDocument/2006/relationships" xmlns:p="http://schemas.openxmlformats.org/presentationml/2006/main">
   <p:cSld>
     <p:bg>
@@ -12531,7 +12558,7 @@
 </p:sld>
 </file>
 
-<file path=ppt/slides/slide6.xml><?xml version="1.0" encoding="utf-8"?>
+<file path=ppt/slides/slide5.xml><?xml version="1.0" encoding="utf-8"?>
 <p:sld xmlns:a="http://schemas.openxmlformats.org/drawingml/2006/main" xmlns:r="http://schemas.openxmlformats.org/officeDocument/2006/relationships" xmlns:p="http://schemas.openxmlformats.org/presentationml/2006/main">
   <p:cSld>
     <p:bg>
@@ -13402,7 +13429,7 @@
 </p:sld>
 </file>
 
-<file path=ppt/slides/slide7.xml><?xml version="1.0" encoding="utf-8"?>
+<file path=ppt/slides/slide6.xml><?xml version="1.0" encoding="utf-8"?>
 <p:sld xmlns:a="http://schemas.openxmlformats.org/drawingml/2006/main" xmlns:r="http://schemas.openxmlformats.org/officeDocument/2006/relationships" xmlns:p="http://schemas.openxmlformats.org/presentationml/2006/main">
   <p:cSld>
     <p:bg>
@@ -14260,6 +14287,420 @@
   </p:cSld>
   <p:clrMapOvr>
     <a:overrideClrMapping bg1="dk1" tx1="lt1" bg2="dk2" tx2="lt2" accent1="accent1" accent2="accent2" accent3="accent3" accent4="accent4" accent5="accent5" accent6="accent6" hlink="hlink" folHlink="folHlink"/>
+  </p:clrMapOvr>
+</p:sld>
+</file>
+
+<file path=ppt/slides/slide7.xml><?xml version="1.0" encoding="utf-8"?>
+<p:sld xmlns:a="http://schemas.openxmlformats.org/drawingml/2006/main" xmlns:r="http://schemas.openxmlformats.org/officeDocument/2006/relationships" xmlns:p="http://schemas.openxmlformats.org/presentationml/2006/main">
+  <p:cSld>
+    <p:spTree>
+      <p:nvGrpSpPr>
+        <p:cNvPr id="1" name=""/>
+        <p:cNvGrpSpPr/>
+        <p:nvPr/>
+      </p:nvGrpSpPr>
+      <p:grpSpPr>
+        <a:xfrm>
+          <a:off x="0" y="0"/>
+          <a:ext cx="0" cy="0"/>
+          <a:chOff x="0" y="0"/>
+          <a:chExt cx="0" cy="0"/>
+        </a:xfrm>
+      </p:grpSpPr>
+      <p:sp>
+        <p:nvSpPr>
+          <p:cNvPr id="2" name="Title 1">
+            <a:extLst>
+              <a:ext uri="{FF2B5EF4-FFF2-40B4-BE49-F238E27FC236}">
+                <a16:creationId xmlns:a16="http://schemas.microsoft.com/office/drawing/2014/main" id="{BF41A5CB-8505-42EF-B91C-63787E14E885}"/>
+              </a:ext>
+            </a:extLst>
+          </p:cNvPr>
+          <p:cNvSpPr>
+            <a:spLocks noGrp="1"/>
+          </p:cNvSpPr>
+          <p:nvPr>
+            <p:ph type="title"/>
+          </p:nvPr>
+        </p:nvSpPr>
+        <p:spPr/>
+        <p:txBody>
+          <a:bodyPr/>
+          <a:lstStyle/>
+          <a:p>
+            <a:r>
+              <a:rPr lang="en-GB" dirty="0"/>
+              <a:t>Innovation</a:t>
+            </a:r>
+          </a:p>
+        </p:txBody>
+      </p:sp>
+      <p:sp>
+        <p:nvSpPr>
+          <p:cNvPr id="3" name="Content Placeholder 2">
+            <a:extLst>
+              <a:ext uri="{FF2B5EF4-FFF2-40B4-BE49-F238E27FC236}">
+                <a16:creationId xmlns:a16="http://schemas.microsoft.com/office/drawing/2014/main" id="{3D6EBD5E-85B1-43E0-8214-7BB7844F9049}"/>
+              </a:ext>
+            </a:extLst>
+          </p:cNvPr>
+          <p:cNvSpPr>
+            <a:spLocks noGrp="1"/>
+          </p:cNvSpPr>
+          <p:nvPr>
+            <p:ph idx="1"/>
+          </p:nvPr>
+        </p:nvSpPr>
+        <p:spPr/>
+        <p:txBody>
+          <a:bodyPr>
+            <a:normAutofit fontScale="70000" lnSpcReduction="20000"/>
+          </a:bodyPr>
+          <a:lstStyle/>
+          <a:p>
+            <a:r>
+              <a:rPr lang="en-GB" dirty="0"/>
+              <a:t>Teams should be able to demonstrate why it is innovative and creative by having a solid grasp of the market / genre of their prototype, backing up their claims with tangible evidence from playtesting, engaging with a wider audience and feedback.</a:t>
+            </a:r>
+          </a:p>
+          <a:p>
+            <a:r>
+              <a:rPr lang="en-GB" dirty="0"/>
+              <a:t>Consider: </a:t>
+            </a:r>
+          </a:p>
+          <a:p>
+            <a:r>
+              <a:rPr lang="en-GB" dirty="0"/>
+              <a:t>• What is already out in the market? </a:t>
+            </a:r>
+          </a:p>
+          <a:p>
+            <a:r>
+              <a:rPr lang="en-GB" dirty="0"/>
+              <a:t>• What is missing from the market? </a:t>
+            </a:r>
+          </a:p>
+          <a:p>
+            <a:r>
+              <a:rPr lang="en-GB" dirty="0"/>
+              <a:t>• How your games’ innovation will fill the gap and meet the need? </a:t>
+            </a:r>
+          </a:p>
+          <a:p>
+            <a:endParaRPr lang="en-GB" dirty="0"/>
+          </a:p>
+          <a:p>
+            <a:pPr marL="0" indent="0">
+              <a:buNone/>
+            </a:pPr>
+            <a:r>
+              <a:rPr lang="en-GB" dirty="0"/>
+              <a:t>Already on the market: Mirrors edge, Titanfall</a:t>
+            </a:r>
+          </a:p>
+          <a:p>
+            <a:pPr marL="0" indent="0">
+              <a:buNone/>
+            </a:pPr>
+            <a:endParaRPr lang="en-GB" dirty="0"/>
+          </a:p>
+          <a:p>
+            <a:pPr marL="0" indent="0">
+              <a:buNone/>
+            </a:pPr>
+            <a:r>
+              <a:rPr lang="en-GB" dirty="0"/>
+              <a:t>What is missing from the market: Not had a memorable parkour fps since Titanfall, so with </a:t>
+            </a:r>
+            <a:r>
+              <a:rPr lang="en-GB" dirty="0" err="1"/>
+              <a:t>CyberFocus</a:t>
+            </a:r>
+            <a:r>
+              <a:rPr lang="en-GB" dirty="0"/>
+              <a:t> we can bring back interest by promoting this on the market</a:t>
+            </a:r>
+          </a:p>
+          <a:p>
+            <a:pPr marL="0" indent="0">
+              <a:buNone/>
+            </a:pPr>
+            <a:endParaRPr lang="en-GB" dirty="0"/>
+          </a:p>
+          <a:p>
+            <a:pPr marL="0" indent="0">
+              <a:buNone/>
+            </a:pPr>
+            <a:r>
+              <a:rPr lang="en-GB" dirty="0"/>
+              <a:t>The games innovation will fill the gap by bringing familiar mechanics to the fps genre but mixed with new fun and engaging mechanics that players will find new and want to experiment with.</a:t>
+            </a:r>
+          </a:p>
+        </p:txBody>
+      </p:sp>
+    </p:spTree>
+    <p:extLst>
+      <p:ext uri="{BB962C8B-B14F-4D97-AF65-F5344CB8AC3E}">
+        <p14:creationId xmlns:p14="http://schemas.microsoft.com/office/powerpoint/2010/main" val="1237780850"/>
+      </p:ext>
+    </p:extLst>
+  </p:cSld>
+  <p:clrMapOvr>
+    <a:masterClrMapping/>
+  </p:clrMapOvr>
+</p:sld>
+</file>
+
+<file path=ppt/slides/slide8.xml><?xml version="1.0" encoding="utf-8"?>
+<p:sld xmlns:a="http://schemas.openxmlformats.org/drawingml/2006/main" xmlns:r="http://schemas.openxmlformats.org/officeDocument/2006/relationships" xmlns:p="http://schemas.openxmlformats.org/presentationml/2006/main">
+  <p:cSld>
+    <p:spTree>
+      <p:nvGrpSpPr>
+        <p:cNvPr id="1" name=""/>
+        <p:cNvGrpSpPr/>
+        <p:nvPr/>
+      </p:nvGrpSpPr>
+      <p:grpSpPr>
+        <a:xfrm>
+          <a:off x="0" y="0"/>
+          <a:ext cx="0" cy="0"/>
+          <a:chOff x="0" y="0"/>
+          <a:chExt cx="0" cy="0"/>
+        </a:xfrm>
+      </p:grpSpPr>
+      <p:sp>
+        <p:nvSpPr>
+          <p:cNvPr id="2" name="Title 1">
+            <a:extLst>
+              <a:ext uri="{FF2B5EF4-FFF2-40B4-BE49-F238E27FC236}">
+                <a16:creationId xmlns:a16="http://schemas.microsoft.com/office/drawing/2014/main" id="{BF41A5CB-8505-42EF-B91C-63787E14E885}"/>
+              </a:ext>
+            </a:extLst>
+          </p:cNvPr>
+          <p:cNvSpPr>
+            <a:spLocks noGrp="1"/>
+          </p:cNvSpPr>
+          <p:nvPr>
+            <p:ph type="title"/>
+          </p:nvPr>
+        </p:nvSpPr>
+        <p:spPr/>
+        <p:txBody>
+          <a:bodyPr/>
+          <a:lstStyle/>
+          <a:p>
+            <a:r>
+              <a:rPr lang="en-GB" dirty="0"/>
+              <a:t>Company development team</a:t>
+            </a:r>
+          </a:p>
+        </p:txBody>
+      </p:sp>
+      <p:sp>
+        <p:nvSpPr>
+          <p:cNvPr id="3" name="Content Placeholder 2">
+            <a:extLst>
+              <a:ext uri="{FF2B5EF4-FFF2-40B4-BE49-F238E27FC236}">
+                <a16:creationId xmlns:a16="http://schemas.microsoft.com/office/drawing/2014/main" id="{3D6EBD5E-85B1-43E0-8214-7BB7844F9049}"/>
+              </a:ext>
+            </a:extLst>
+          </p:cNvPr>
+          <p:cNvSpPr>
+            <a:spLocks noGrp="1"/>
+          </p:cNvSpPr>
+          <p:nvPr>
+            <p:ph idx="1"/>
+          </p:nvPr>
+        </p:nvSpPr>
+        <p:spPr/>
+        <p:txBody>
+          <a:bodyPr>
+            <a:normAutofit lnSpcReduction="10000"/>
+          </a:bodyPr>
+          <a:lstStyle/>
+          <a:p>
+            <a:r>
+              <a:rPr lang="en-GB" dirty="0"/>
+              <a:t>You should provide high level information about your team (it should be concise and relevant).   Draw on key skill sets and experience that complement and enhance your prototype offering.  Information shared should instil confidence that your team can deliver the prototype development plan on time, to budget and to a high standard.</a:t>
+            </a:r>
+          </a:p>
+          <a:p>
+            <a:endParaRPr lang="en-GB" dirty="0"/>
+          </a:p>
+          <a:p>
+            <a:r>
+              <a:rPr lang="en-GB" dirty="0"/>
+              <a:t>Brodie – programmer proficient in C#, attended </a:t>
+            </a:r>
+            <a:r>
+              <a:rPr lang="en-GB" dirty="0" err="1"/>
+              <a:t>gamejams</a:t>
+            </a:r>
+            <a:r>
+              <a:rPr lang="en-GB" dirty="0"/>
+              <a:t> (experience working in teams an sticking to deadlines) and always open to feedback.</a:t>
+            </a:r>
+          </a:p>
+          <a:p>
+            <a:r>
+              <a:rPr lang="en-GB" dirty="0"/>
+              <a:t>Pawel – Comfortable with the Unity engine, Experience creating levels (worked alongside him on various projects)</a:t>
+            </a:r>
+          </a:p>
+          <a:p>
+            <a:r>
+              <a:rPr lang="en-GB" dirty="0"/>
+              <a:t>Samuel – 3D Modeller, experience collaborating with different teams (games and animation students), experienced in environment modelling</a:t>
+            </a:r>
+          </a:p>
+        </p:txBody>
+      </p:sp>
+    </p:spTree>
+    <p:extLst>
+      <p:ext uri="{BB962C8B-B14F-4D97-AF65-F5344CB8AC3E}">
+        <p14:creationId xmlns:p14="http://schemas.microsoft.com/office/powerpoint/2010/main" val="2561268040"/>
+      </p:ext>
+    </p:extLst>
+  </p:cSld>
+  <p:clrMapOvr>
+    <a:masterClrMapping/>
+  </p:clrMapOvr>
+</p:sld>
+</file>
+
+<file path=ppt/slides/slide9.xml><?xml version="1.0" encoding="utf-8"?>
+<p:sld xmlns:a="http://schemas.openxmlformats.org/drawingml/2006/main" xmlns:r="http://schemas.openxmlformats.org/officeDocument/2006/relationships" xmlns:p="http://schemas.openxmlformats.org/presentationml/2006/main">
+  <p:cSld>
+    <p:spTree>
+      <p:nvGrpSpPr>
+        <p:cNvPr id="1" name=""/>
+        <p:cNvGrpSpPr/>
+        <p:nvPr/>
+      </p:nvGrpSpPr>
+      <p:grpSpPr>
+        <a:xfrm>
+          <a:off x="0" y="0"/>
+          <a:ext cx="0" cy="0"/>
+          <a:chOff x="0" y="0"/>
+          <a:chExt cx="0" cy="0"/>
+        </a:xfrm>
+      </p:grpSpPr>
+      <p:sp>
+        <p:nvSpPr>
+          <p:cNvPr id="2" name="Title 1">
+            <a:extLst>
+              <a:ext uri="{FF2B5EF4-FFF2-40B4-BE49-F238E27FC236}">
+                <a16:creationId xmlns:a16="http://schemas.microsoft.com/office/drawing/2014/main" id="{BF41A5CB-8505-42EF-B91C-63787E14E885}"/>
+              </a:ext>
+            </a:extLst>
+          </p:cNvPr>
+          <p:cNvSpPr>
+            <a:spLocks noGrp="1"/>
+          </p:cNvSpPr>
+          <p:nvPr>
+            <p:ph type="title"/>
+          </p:nvPr>
+        </p:nvSpPr>
+        <p:spPr/>
+        <p:txBody>
+          <a:bodyPr/>
+          <a:lstStyle/>
+          <a:p>
+            <a:r>
+              <a:rPr lang="en-GB" dirty="0"/>
+              <a:t>Shipping</a:t>
+            </a:r>
+          </a:p>
+        </p:txBody>
+      </p:sp>
+      <p:sp>
+        <p:nvSpPr>
+          <p:cNvPr id="3" name="Content Placeholder 2">
+            <a:extLst>
+              <a:ext uri="{FF2B5EF4-FFF2-40B4-BE49-F238E27FC236}">
+                <a16:creationId xmlns:a16="http://schemas.microsoft.com/office/drawing/2014/main" id="{3D6EBD5E-85B1-43E0-8214-7BB7844F9049}"/>
+              </a:ext>
+            </a:extLst>
+          </p:cNvPr>
+          <p:cNvSpPr>
+            <a:spLocks noGrp="1"/>
+          </p:cNvSpPr>
+          <p:nvPr>
+            <p:ph idx="1"/>
+          </p:nvPr>
+        </p:nvSpPr>
+        <p:spPr/>
+        <p:txBody>
+          <a:bodyPr>
+            <a:normAutofit lnSpcReduction="10000"/>
+          </a:bodyPr>
+          <a:lstStyle/>
+          <a:p>
+            <a:r>
+              <a:rPr lang="en-GB" dirty="0"/>
+              <a:t>Clear understanding of: </a:t>
+            </a:r>
+          </a:p>
+          <a:p>
+            <a:r>
+              <a:rPr lang="en-GB" dirty="0"/>
+              <a:t>• Platforms for shipping the finished game </a:t>
+            </a:r>
+          </a:p>
+          <a:p>
+            <a:r>
+              <a:rPr lang="en-GB" dirty="0"/>
+              <a:t>• Go-to-market plan </a:t>
+            </a:r>
+          </a:p>
+          <a:p>
+            <a:pPr lvl="1"/>
+            <a:r>
+              <a:rPr lang="en-GB" dirty="0"/>
+              <a:t>o Route to market: self-publish / publisher / other route with robust plan and understanding of how they will successfully deliver their game and realise projected revenue </a:t>
+            </a:r>
+          </a:p>
+          <a:p>
+            <a:pPr lvl="1"/>
+            <a:r>
+              <a:rPr lang="en-GB" dirty="0"/>
+              <a:t>o Revenue model for example F2P, Premium, Subscription, and/or DLC plans </a:t>
+            </a:r>
+          </a:p>
+          <a:p>
+            <a:r>
+              <a:rPr lang="en-GB" dirty="0"/>
+              <a:t>• Timescale for release </a:t>
+            </a:r>
+          </a:p>
+          <a:p>
+            <a:endParaRPr lang="en-GB" dirty="0"/>
+          </a:p>
+          <a:p>
+            <a:r>
+              <a:rPr lang="en-GB" dirty="0"/>
+              <a:t>Ship to PC first then release for console. Provide controller support for PC.</a:t>
+            </a:r>
+          </a:p>
+          <a:p>
+            <a:r>
+              <a:rPr lang="en-GB" dirty="0"/>
+              <a:t>Market plan: </a:t>
+            </a:r>
+          </a:p>
+        </p:txBody>
+      </p:sp>
+    </p:spTree>
+    <p:extLst>
+      <p:ext uri="{BB962C8B-B14F-4D97-AF65-F5344CB8AC3E}">
+        <p14:creationId xmlns:p14="http://schemas.microsoft.com/office/powerpoint/2010/main" val="1303241696"/>
+      </p:ext>
+    </p:extLst>
+  </p:cSld>
+  <p:clrMapOvr>
+    <a:masterClrMapping/>
   </p:clrMapOvr>
 </p:sld>
 </file>

</xml_diff>

<commit_message>
Added some images to slideshow
</commit_message>
<xml_diff>
--- a/Virtual Pitch Presentation/Pitch.pptx
+++ b/Virtual Pitch Presentation/Pitch.pptx
@@ -10819,6 +10819,100 @@
           </a:p>
         </p:txBody>
       </p:sp>
+      <p:pic>
+        <p:nvPicPr>
+          <p:cNvPr id="1026" name="Picture 2">
+            <a:extLst>
+              <a:ext uri="{FF2B5EF4-FFF2-40B4-BE49-F238E27FC236}">
+                <a16:creationId xmlns:a16="http://schemas.microsoft.com/office/drawing/2014/main" id="{B81B9ECC-05D5-43FF-B59A-29FFEF264406}"/>
+              </a:ext>
+            </a:extLst>
+          </p:cNvPr>
+          <p:cNvPicPr>
+            <a:picLocks noChangeAspect="1" noChangeArrowheads="1"/>
+          </p:cNvPicPr>
+          <p:nvPr/>
+        </p:nvPicPr>
+        <p:blipFill>
+          <a:blip r:embed="rId3">
+            <a:extLst>
+              <a:ext uri="{28A0092B-C50C-407E-A947-70E740481C1C}">
+                <a14:useLocalDpi xmlns:a14="http://schemas.microsoft.com/office/drawing/2010/main" val="0"/>
+              </a:ext>
+            </a:extLst>
+          </a:blip>
+          <a:srcRect/>
+          <a:stretch>
+            <a:fillRect/>
+          </a:stretch>
+        </p:blipFill>
+        <p:spPr bwMode="auto">
+          <a:xfrm>
+            <a:off x="396826" y="3716735"/>
+            <a:ext cx="4395609" cy="2472530"/>
+          </a:xfrm>
+          <a:prstGeom prst="rect">
+            <a:avLst/>
+          </a:prstGeom>
+          <a:noFill/>
+          <a:extLst>
+            <a:ext uri="{909E8E84-426E-40DD-AFC4-6F175D3DCCD1}">
+              <a14:hiddenFill xmlns:a14="http://schemas.microsoft.com/office/drawing/2010/main">
+                <a:solidFill>
+                  <a:srgbClr val="FFFFFF"/>
+                </a:solidFill>
+              </a14:hiddenFill>
+            </a:ext>
+          </a:extLst>
+        </p:spPr>
+      </p:pic>
+      <p:pic>
+        <p:nvPicPr>
+          <p:cNvPr id="4" name="Picture 2">
+            <a:extLst>
+              <a:ext uri="{FF2B5EF4-FFF2-40B4-BE49-F238E27FC236}">
+                <a16:creationId xmlns:a16="http://schemas.microsoft.com/office/drawing/2014/main" id="{832DEC83-198A-4D5F-8B5A-050F270AF61F}"/>
+              </a:ext>
+            </a:extLst>
+          </p:cNvPr>
+          <p:cNvPicPr>
+            <a:picLocks noChangeAspect="1" noChangeArrowheads="1"/>
+          </p:cNvPicPr>
+          <p:nvPr/>
+        </p:nvPicPr>
+        <p:blipFill>
+          <a:blip r:embed="rId4">
+            <a:extLst>
+              <a:ext uri="{28A0092B-C50C-407E-A947-70E740481C1C}">
+                <a14:useLocalDpi xmlns:a14="http://schemas.microsoft.com/office/drawing/2010/main" val="0"/>
+              </a:ext>
+            </a:extLst>
+          </a:blip>
+          <a:srcRect/>
+          <a:stretch>
+            <a:fillRect/>
+          </a:stretch>
+        </p:blipFill>
+        <p:spPr bwMode="auto">
+          <a:xfrm>
+            <a:off x="6392256" y="4262775"/>
+            <a:ext cx="4395609" cy="2472530"/>
+          </a:xfrm>
+          <a:prstGeom prst="rect">
+            <a:avLst/>
+          </a:prstGeom>
+          <a:noFill/>
+          <a:extLst>
+            <a:ext uri="{909E8E84-426E-40DD-AFC4-6F175D3DCCD1}">
+              <a14:hiddenFill xmlns:a14="http://schemas.microsoft.com/office/drawing/2010/main">
+                <a:solidFill>
+                  <a:srgbClr val="FFFFFF"/>
+                </a:solidFill>
+              </a14:hiddenFill>
+            </a:ext>
+          </a:extLst>
+        </p:spPr>
+      </p:pic>
     </p:spTree>
     <p:extLst>
       <p:ext uri="{BB962C8B-B14F-4D97-AF65-F5344CB8AC3E}">

</xml_diff>

<commit_message>
Changes to scenes files
</commit_message>
<xml_diff>
--- a/Virtual Pitch Presentation/Pitch.pptx
+++ b/Virtual Pitch Presentation/Pitch.pptx
@@ -211,7 +211,7 @@
           <a:p>
             <a:fld id="{6548716A-9AA1-4737-8475-8931B3DEA5E3}" type="datetimeFigureOut">
               <a:rPr lang="en-GB" smtClean="0"/>
-              <a:t>20/07/2020</a:t>
+              <a:t>21/07/2020</a:t>
             </a:fld>
             <a:endParaRPr lang="en-GB"/>
           </a:p>
@@ -544,7 +544,7 @@
           <a:p>
             <a:fld id="{A71A206B-ED20-42CE-B0F2-11AE32B43494}" type="slidenum">
               <a:rPr lang="en-GB" smtClean="0"/>
-              <a:t>5</a:t>
+              <a:t>1</a:t>
             </a:fld>
             <a:endParaRPr lang="en-GB"/>
           </a:p>
@@ -553,7 +553,106 @@
     </p:spTree>
     <p:extLst>
       <p:ext uri="{BB962C8B-B14F-4D97-AF65-F5344CB8AC3E}">
-        <p14:creationId xmlns:p14="http://schemas.microsoft.com/office/powerpoint/2010/main" val="361351420"/>
+        <p14:creationId xmlns:p14="http://schemas.microsoft.com/office/powerpoint/2010/main" val="426614741"/>
+      </p:ext>
+    </p:extLst>
+  </p:cSld>
+  <p:clrMapOvr>
+    <a:masterClrMapping/>
+  </p:clrMapOvr>
+</p:notes>
+</file>
+
+<file path=ppt/notesSlides/notesSlide10.xml><?xml version="1.0" encoding="utf-8"?>
+<p:notes xmlns:a="http://schemas.openxmlformats.org/drawingml/2006/main" xmlns:r="http://schemas.openxmlformats.org/officeDocument/2006/relationships" xmlns:p="http://schemas.openxmlformats.org/presentationml/2006/main">
+  <p:cSld>
+    <p:spTree>
+      <p:nvGrpSpPr>
+        <p:cNvPr id="1" name=""/>
+        <p:cNvGrpSpPr/>
+        <p:nvPr/>
+      </p:nvGrpSpPr>
+      <p:grpSpPr>
+        <a:xfrm>
+          <a:off x="0" y="0"/>
+          <a:ext cx="0" cy="0"/>
+          <a:chOff x="0" y="0"/>
+          <a:chExt cx="0" cy="0"/>
+        </a:xfrm>
+      </p:grpSpPr>
+      <p:sp>
+        <p:nvSpPr>
+          <p:cNvPr id="2" name="Slide Image Placeholder 1"/>
+          <p:cNvSpPr>
+            <a:spLocks noGrp="1" noRot="1" noChangeAspect="1"/>
+          </p:cNvSpPr>
+          <p:nvPr>
+            <p:ph type="sldImg"/>
+          </p:nvPr>
+        </p:nvSpPr>
+        <p:spPr/>
+      </p:sp>
+      <p:sp>
+        <p:nvSpPr>
+          <p:cNvPr id="3" name="Notes Placeholder 2"/>
+          <p:cNvSpPr>
+            <a:spLocks noGrp="1"/>
+          </p:cNvSpPr>
+          <p:nvPr>
+            <p:ph type="body" idx="1"/>
+          </p:nvPr>
+        </p:nvSpPr>
+        <p:spPr/>
+        <p:txBody>
+          <a:bodyPr/>
+          <a:lstStyle/>
+          <a:p>
+            <a:r>
+              <a:rPr lang="en-GB" dirty="0"/>
+              <a:t>Backstory: set in the future, the player is designed by a company that specialises in cyborg technology. With them being a cyborg, they have the ability to wall run, slow down time and parkour.</a:t>
+            </a:r>
+          </a:p>
+          <a:p>
+            <a:endParaRPr lang="en-GB" dirty="0"/>
+          </a:p>
+          <a:p>
+            <a:r>
+              <a:rPr lang="en-GB" dirty="0"/>
+              <a:t>In the next slide we will discuss the 3 phase model we are creating for the player to follow and understand the game better.</a:t>
+            </a:r>
+          </a:p>
+          <a:p>
+            <a:endParaRPr lang="en-GB" dirty="0"/>
+          </a:p>
+        </p:txBody>
+      </p:sp>
+      <p:sp>
+        <p:nvSpPr>
+          <p:cNvPr id="4" name="Slide Number Placeholder 3"/>
+          <p:cNvSpPr>
+            <a:spLocks noGrp="1"/>
+          </p:cNvSpPr>
+          <p:nvPr>
+            <p:ph type="sldNum" sz="quarter" idx="5"/>
+          </p:nvPr>
+        </p:nvSpPr>
+        <p:spPr/>
+        <p:txBody>
+          <a:bodyPr/>
+          <a:lstStyle/>
+          <a:p>
+            <a:fld id="{A71A206B-ED20-42CE-B0F2-11AE32B43494}" type="slidenum">
+              <a:rPr lang="en-GB" smtClean="0"/>
+              <a:t>13</a:t>
+            </a:fld>
+            <a:endParaRPr lang="en-GB"/>
+          </a:p>
+        </p:txBody>
+      </p:sp>
+    </p:spTree>
+    <p:extLst>
+      <p:ext uri="{BB962C8B-B14F-4D97-AF65-F5344CB8AC3E}">
+        <p14:creationId xmlns:p14="http://schemas.microsoft.com/office/powerpoint/2010/main" val="3100905978"/>
       </p:ext>
     </p:extLst>
   </p:cSld>
@@ -607,21 +706,6 @@
           <a:bodyPr/>
           <a:lstStyle/>
           <a:p>
-            <a:r>
-              <a:rPr lang="en-GB" dirty="0"/>
-              <a:t>Backstory: set in the future, the player is designed by a company that specialises in cyborg technology. With them being a cyborg, they have the ability to wall run, slow down time and parkour.</a:t>
-            </a:r>
-          </a:p>
-          <a:p>
-            <a:endParaRPr lang="en-GB" dirty="0"/>
-          </a:p>
-          <a:p>
-            <a:r>
-              <a:rPr lang="en-GB" dirty="0"/>
-              <a:t>In the next slide we will discuss the 3 phase model we are creating for the player to follow and understand the game better.</a:t>
-            </a:r>
-          </a:p>
-          <a:p>
             <a:endParaRPr lang="en-GB" dirty="0"/>
           </a:p>
         </p:txBody>
@@ -643,7 +727,7 @@
           <a:p>
             <a:fld id="{A71A206B-ED20-42CE-B0F2-11AE32B43494}" type="slidenum">
               <a:rPr lang="en-GB" smtClean="0"/>
-              <a:t>6</a:t>
+              <a:t>5</a:t>
             </a:fld>
             <a:endParaRPr lang="en-GB"/>
           </a:p>
@@ -652,7 +736,7 @@
     </p:spTree>
     <p:extLst>
       <p:ext uri="{BB962C8B-B14F-4D97-AF65-F5344CB8AC3E}">
-        <p14:creationId xmlns:p14="http://schemas.microsoft.com/office/powerpoint/2010/main" val="2440929865"/>
+        <p14:creationId xmlns:p14="http://schemas.microsoft.com/office/powerpoint/2010/main" val="361351420"/>
       </p:ext>
     </p:extLst>
   </p:cSld>
@@ -742,7 +826,7 @@
           <a:p>
             <a:fld id="{A71A206B-ED20-42CE-B0F2-11AE32B43494}" type="slidenum">
               <a:rPr lang="en-GB" smtClean="0"/>
-              <a:t>7</a:t>
+              <a:t>6</a:t>
             </a:fld>
             <a:endParaRPr lang="en-GB"/>
           </a:p>
@@ -751,7 +835,7 @@
     </p:spTree>
     <p:extLst>
       <p:ext uri="{BB962C8B-B14F-4D97-AF65-F5344CB8AC3E}">
-        <p14:creationId xmlns:p14="http://schemas.microsoft.com/office/powerpoint/2010/main" val="1778043408"/>
+        <p14:creationId xmlns:p14="http://schemas.microsoft.com/office/powerpoint/2010/main" val="2440929865"/>
       </p:ext>
     </p:extLst>
   </p:cSld>
@@ -841,7 +925,7 @@
           <a:p>
             <a:fld id="{A71A206B-ED20-42CE-B0F2-11AE32B43494}" type="slidenum">
               <a:rPr lang="en-GB" smtClean="0"/>
-              <a:t>8</a:t>
+              <a:t>7</a:t>
             </a:fld>
             <a:endParaRPr lang="en-GB"/>
           </a:p>
@@ -850,7 +934,7 @@
     </p:spTree>
     <p:extLst>
       <p:ext uri="{BB962C8B-B14F-4D97-AF65-F5344CB8AC3E}">
-        <p14:creationId xmlns:p14="http://schemas.microsoft.com/office/powerpoint/2010/main" val="87694666"/>
+        <p14:creationId xmlns:p14="http://schemas.microsoft.com/office/powerpoint/2010/main" val="1778043408"/>
       </p:ext>
     </p:extLst>
   </p:cSld>
@@ -940,7 +1024,7 @@
           <a:p>
             <a:fld id="{A71A206B-ED20-42CE-B0F2-11AE32B43494}" type="slidenum">
               <a:rPr lang="en-GB" smtClean="0"/>
-              <a:t>9</a:t>
+              <a:t>8</a:t>
             </a:fld>
             <a:endParaRPr lang="en-GB"/>
           </a:p>
@@ -949,7 +1033,7 @@
     </p:spTree>
     <p:extLst>
       <p:ext uri="{BB962C8B-B14F-4D97-AF65-F5344CB8AC3E}">
-        <p14:creationId xmlns:p14="http://schemas.microsoft.com/office/powerpoint/2010/main" val="3973204389"/>
+        <p14:creationId xmlns:p14="http://schemas.microsoft.com/office/powerpoint/2010/main" val="87694666"/>
       </p:ext>
     </p:extLst>
   </p:cSld>
@@ -1039,7 +1123,7 @@
           <a:p>
             <a:fld id="{A71A206B-ED20-42CE-B0F2-11AE32B43494}" type="slidenum">
               <a:rPr lang="en-GB" smtClean="0"/>
-              <a:t>10</a:t>
+              <a:t>9</a:t>
             </a:fld>
             <a:endParaRPr lang="en-GB"/>
           </a:p>
@@ -1048,7 +1132,7 @@
     </p:spTree>
     <p:extLst>
       <p:ext uri="{BB962C8B-B14F-4D97-AF65-F5344CB8AC3E}">
-        <p14:creationId xmlns:p14="http://schemas.microsoft.com/office/powerpoint/2010/main" val="1076773610"/>
+        <p14:creationId xmlns:p14="http://schemas.microsoft.com/office/powerpoint/2010/main" val="3973204389"/>
       </p:ext>
     </p:extLst>
   </p:cSld>
@@ -1138,7 +1222,7 @@
           <a:p>
             <a:fld id="{A71A206B-ED20-42CE-B0F2-11AE32B43494}" type="slidenum">
               <a:rPr lang="en-GB" smtClean="0"/>
-              <a:t>11</a:t>
+              <a:t>10</a:t>
             </a:fld>
             <a:endParaRPr lang="en-GB"/>
           </a:p>
@@ -1147,7 +1231,7 @@
     </p:spTree>
     <p:extLst>
       <p:ext uri="{BB962C8B-B14F-4D97-AF65-F5344CB8AC3E}">
-        <p14:creationId xmlns:p14="http://schemas.microsoft.com/office/powerpoint/2010/main" val="3568610610"/>
+        <p14:creationId xmlns:p14="http://schemas.microsoft.com/office/powerpoint/2010/main" val="1076773610"/>
       </p:ext>
     </p:extLst>
   </p:cSld>
@@ -1237,7 +1321,7 @@
           <a:p>
             <a:fld id="{A71A206B-ED20-42CE-B0F2-11AE32B43494}" type="slidenum">
               <a:rPr lang="en-GB" smtClean="0"/>
-              <a:t>12</a:t>
+              <a:t>11</a:t>
             </a:fld>
             <a:endParaRPr lang="en-GB"/>
           </a:p>
@@ -1246,7 +1330,7 @@
     </p:spTree>
     <p:extLst>
       <p:ext uri="{BB962C8B-B14F-4D97-AF65-F5344CB8AC3E}">
-        <p14:creationId xmlns:p14="http://schemas.microsoft.com/office/powerpoint/2010/main" val="3405253058"/>
+        <p14:creationId xmlns:p14="http://schemas.microsoft.com/office/powerpoint/2010/main" val="3568610610"/>
       </p:ext>
     </p:extLst>
   </p:cSld>
@@ -1336,7 +1420,7 @@
           <a:p>
             <a:fld id="{A71A206B-ED20-42CE-B0F2-11AE32B43494}" type="slidenum">
               <a:rPr lang="en-GB" smtClean="0"/>
-              <a:t>13</a:t>
+              <a:t>12</a:t>
             </a:fld>
             <a:endParaRPr lang="en-GB"/>
           </a:p>
@@ -1345,7 +1429,7 @@
     </p:spTree>
     <p:extLst>
       <p:ext uri="{BB962C8B-B14F-4D97-AF65-F5344CB8AC3E}">
-        <p14:creationId xmlns:p14="http://schemas.microsoft.com/office/powerpoint/2010/main" val="3100905978"/>
+        <p14:creationId xmlns:p14="http://schemas.microsoft.com/office/powerpoint/2010/main" val="3405253058"/>
       </p:ext>
     </p:extLst>
   </p:cSld>
@@ -2079,7 +2163,7 @@
           <a:p>
             <a:fld id="{596B1921-B6CA-4D11-B318-D7AC0C0445B6}" type="datetimeFigureOut">
               <a:rPr lang="en-GB" smtClean="0"/>
-              <a:t>20/07/2020</a:t>
+              <a:t>21/07/2020</a:t>
             </a:fld>
             <a:endParaRPr lang="en-GB"/>
           </a:p>
@@ -2330,7 +2414,7 @@
           <a:p>
             <a:fld id="{596B1921-B6CA-4D11-B318-D7AC0C0445B6}" type="datetimeFigureOut">
               <a:rPr lang="en-GB" smtClean="0"/>
-              <a:t>20/07/2020</a:t>
+              <a:t>21/07/2020</a:t>
             </a:fld>
             <a:endParaRPr lang="en-GB"/>
           </a:p>
@@ -2644,7 +2728,7 @@
           <a:p>
             <a:fld id="{596B1921-B6CA-4D11-B318-D7AC0C0445B6}" type="datetimeFigureOut">
               <a:rPr lang="en-GB" smtClean="0"/>
-              <a:t>20/07/2020</a:t>
+              <a:t>21/07/2020</a:t>
             </a:fld>
             <a:endParaRPr lang="en-GB"/>
           </a:p>
@@ -2971,7 +3055,7 @@
           <a:p>
             <a:fld id="{596B1921-B6CA-4D11-B318-D7AC0C0445B6}" type="datetimeFigureOut">
               <a:rPr lang="en-GB" smtClean="0"/>
-              <a:t>20/07/2020</a:t>
+              <a:t>21/07/2020</a:t>
             </a:fld>
             <a:endParaRPr lang="en-GB"/>
           </a:p>
@@ -3285,7 +3369,7 @@
           <a:p>
             <a:fld id="{596B1921-B6CA-4D11-B318-D7AC0C0445B6}" type="datetimeFigureOut">
               <a:rPr lang="en-GB" smtClean="0"/>
-              <a:t>20/07/2020</a:t>
+              <a:t>21/07/2020</a:t>
             </a:fld>
             <a:endParaRPr lang="en-GB"/>
           </a:p>
@@ -3672,7 +3756,7 @@
           <a:p>
             <a:fld id="{596B1921-B6CA-4D11-B318-D7AC0C0445B6}" type="datetimeFigureOut">
               <a:rPr lang="en-GB" smtClean="0"/>
-              <a:t>20/07/2020</a:t>
+              <a:t>21/07/2020</a:t>
             </a:fld>
             <a:endParaRPr lang="en-GB"/>
           </a:p>
@@ -3842,7 +3926,7 @@
           <a:p>
             <a:fld id="{596B1921-B6CA-4D11-B318-D7AC0C0445B6}" type="datetimeFigureOut">
               <a:rPr lang="en-GB" smtClean="0"/>
-              <a:t>20/07/2020</a:t>
+              <a:t>21/07/2020</a:t>
             </a:fld>
             <a:endParaRPr lang="en-GB"/>
           </a:p>
@@ -4022,7 +4106,7 @@
           <a:p>
             <a:fld id="{596B1921-B6CA-4D11-B318-D7AC0C0445B6}" type="datetimeFigureOut">
               <a:rPr lang="en-GB" smtClean="0"/>
-              <a:t>20/07/2020</a:t>
+              <a:t>21/07/2020</a:t>
             </a:fld>
             <a:endParaRPr lang="en-GB"/>
           </a:p>
@@ -4198,7 +4282,7 @@
           <a:p>
             <a:fld id="{596B1921-B6CA-4D11-B318-D7AC0C0445B6}" type="datetimeFigureOut">
               <a:rPr lang="en-GB" smtClean="0"/>
-              <a:t>20/07/2020</a:t>
+              <a:t>21/07/2020</a:t>
             </a:fld>
             <a:endParaRPr lang="en-GB"/>
           </a:p>
@@ -4445,7 +4529,7 @@
           <a:p>
             <a:fld id="{596B1921-B6CA-4D11-B318-D7AC0C0445B6}" type="datetimeFigureOut">
               <a:rPr lang="en-GB" smtClean="0"/>
-              <a:t>20/07/2020</a:t>
+              <a:t>21/07/2020</a:t>
             </a:fld>
             <a:endParaRPr lang="en-GB"/>
           </a:p>
@@ -4677,7 +4761,7 @@
           <a:p>
             <a:fld id="{596B1921-B6CA-4D11-B318-D7AC0C0445B6}" type="datetimeFigureOut">
               <a:rPr lang="en-GB" smtClean="0"/>
-              <a:t>20/07/2020</a:t>
+              <a:t>21/07/2020</a:t>
             </a:fld>
             <a:endParaRPr lang="en-GB"/>
           </a:p>
@@ -5051,7 +5135,7 @@
           <a:p>
             <a:fld id="{596B1921-B6CA-4D11-B318-D7AC0C0445B6}" type="datetimeFigureOut">
               <a:rPr lang="en-GB" smtClean="0"/>
-              <a:t>20/07/2020</a:t>
+              <a:t>21/07/2020</a:t>
             </a:fld>
             <a:endParaRPr lang="en-GB"/>
           </a:p>
@@ -5174,7 +5258,7 @@
           <a:p>
             <a:fld id="{596B1921-B6CA-4D11-B318-D7AC0C0445B6}" type="datetimeFigureOut">
               <a:rPr lang="en-GB" smtClean="0"/>
-              <a:t>20/07/2020</a:t>
+              <a:t>21/07/2020</a:t>
             </a:fld>
             <a:endParaRPr lang="en-GB"/>
           </a:p>
@@ -5269,7 +5353,7 @@
           <a:p>
             <a:fld id="{596B1921-B6CA-4D11-B318-D7AC0C0445B6}" type="datetimeFigureOut">
               <a:rPr lang="en-GB" smtClean="0"/>
-              <a:t>20/07/2020</a:t>
+              <a:t>21/07/2020</a:t>
             </a:fld>
             <a:endParaRPr lang="en-GB"/>
           </a:p>
@@ -5524,7 +5608,7 @@
           <a:p>
             <a:fld id="{596B1921-B6CA-4D11-B318-D7AC0C0445B6}" type="datetimeFigureOut">
               <a:rPr lang="en-GB" smtClean="0"/>
-              <a:t>20/07/2020</a:t>
+              <a:t>21/07/2020</a:t>
             </a:fld>
             <a:endParaRPr lang="en-GB"/>
           </a:p>
@@ -5787,7 +5871,7 @@
           <a:p>
             <a:fld id="{596B1921-B6CA-4D11-B318-D7AC0C0445B6}" type="datetimeFigureOut">
               <a:rPr lang="en-GB" smtClean="0"/>
-              <a:t>20/07/2020</a:t>
+              <a:t>21/07/2020</a:t>
             </a:fld>
             <a:endParaRPr lang="en-GB"/>
           </a:p>
@@ -6532,7 +6616,7 @@
           <a:p>
             <a:fld id="{596B1921-B6CA-4D11-B318-D7AC0C0445B6}" type="datetimeFigureOut">
               <a:rPr lang="en-GB" smtClean="0"/>
-              <a:t>20/07/2020</a:t>
+              <a:t>21/07/2020</a:t>
             </a:fld>
             <a:endParaRPr lang="en-GB"/>
           </a:p>
@@ -7058,49 +7142,38 @@
       </p:grpSpPr>
       <p:pic>
         <p:nvPicPr>
-          <p:cNvPr id="1026" name="Picture 2">
+          <p:cNvPr id="5" name="Picture 4" descr="A close up of a sign&#10;&#10;Description automatically generated">
             <a:extLst>
               <a:ext uri="{FF2B5EF4-FFF2-40B4-BE49-F238E27FC236}">
-                <a16:creationId xmlns:a16="http://schemas.microsoft.com/office/drawing/2014/main" id="{FCB4B50A-542B-4A3D-8035-AE699358712D}"/>
+                <a16:creationId xmlns:a16="http://schemas.microsoft.com/office/drawing/2014/main" id="{F4E542EA-3B8D-41CF-B2D0-5B0931CAD94D}"/>
               </a:ext>
             </a:extLst>
           </p:cNvPr>
           <p:cNvPicPr>
-            <a:picLocks noChangeAspect="1" noChangeArrowheads="1"/>
+            <a:picLocks noChangeAspect="1"/>
           </p:cNvPicPr>
           <p:nvPr/>
         </p:nvPicPr>
         <p:blipFill>
-          <a:blip r:embed="rId2">
+          <a:blip r:embed="rId3">
             <a:extLst>
               <a:ext uri="{28A0092B-C50C-407E-A947-70E740481C1C}">
                 <a14:useLocalDpi xmlns:a14="http://schemas.microsoft.com/office/drawing/2010/main" val="0"/>
               </a:ext>
             </a:extLst>
           </a:blip>
-          <a:srcRect/>
           <a:stretch>
             <a:fillRect/>
           </a:stretch>
         </p:blipFill>
-        <p:spPr bwMode="auto">
+        <p:spPr>
           <a:xfrm>
-            <a:off x="3485535" y="1524000"/>
-            <a:ext cx="3810000" cy="3810000"/>
+            <a:off x="3518481" y="851481"/>
+            <a:ext cx="5155038" cy="5155038"/>
           </a:xfrm>
           <a:prstGeom prst="rect">
             <a:avLst/>
           </a:prstGeom>
-          <a:noFill/>
-          <a:extLst>
-            <a:ext uri="{909E8E84-426E-40DD-AFC4-6F175D3DCCD1}">
-              <a14:hiddenFill xmlns:a14="http://schemas.microsoft.com/office/drawing/2010/main">
-                <a:solidFill>
-                  <a:srgbClr val="FFFFFF"/>
-                </a:solidFill>
-              </a14:hiddenFill>
-            </a:ext>
-          </a:extLst>
         </p:spPr>
       </p:pic>
     </p:spTree>

</xml_diff>